<commit_message>
Version BD v 1.2
</commit_message>
<xml_diff>
--- a/Arquitectura del sistema de Recomendacion.pptx
+++ b/Arquitectura del sistema de Recomendacion.pptx
@@ -9,14 +9,13 @@
     <p:sldId id="264" r:id="rId3"/>
     <p:sldId id="257" r:id="rId4"/>
     <p:sldId id="258" r:id="rId5"/>
-    <p:sldId id="259" r:id="rId6"/>
-    <p:sldId id="260" r:id="rId7"/>
-    <p:sldId id="265" r:id="rId8"/>
-    <p:sldId id="256" r:id="rId9"/>
-    <p:sldId id="262" r:id="rId10"/>
-    <p:sldId id="263" r:id="rId11"/>
-    <p:sldId id="266" r:id="rId12"/>
-    <p:sldId id="267" r:id="rId13"/>
+    <p:sldId id="260" r:id="rId6"/>
+    <p:sldId id="265" r:id="rId7"/>
+    <p:sldId id="256" r:id="rId8"/>
+    <p:sldId id="262" r:id="rId9"/>
+    <p:sldId id="263" r:id="rId10"/>
+    <p:sldId id="266" r:id="rId11"/>
+    <p:sldId id="267" r:id="rId12"/>
   </p:sldIdLst>
   <p:sldSz cx="12192000" cy="6858000"/>
   <p:notesSz cx="6858000" cy="9144000"/>
@@ -280,7 +279,7 @@
           <a:p>
             <a:fld id="{34B299F4-7090-4AF8-8998-804EDB480267}" type="datetimeFigureOut">
               <a:rPr lang="es-CO" smtClean="0"/>
-              <a:t>11/09/2018</a:t>
+              <a:t>21/09/2018</a:t>
             </a:fld>
             <a:endParaRPr lang="es-CO"/>
           </a:p>
@@ -480,7 +479,7 @@
           <a:p>
             <a:fld id="{34B299F4-7090-4AF8-8998-804EDB480267}" type="datetimeFigureOut">
               <a:rPr lang="es-CO" smtClean="0"/>
-              <a:t>11/09/2018</a:t>
+              <a:t>21/09/2018</a:t>
             </a:fld>
             <a:endParaRPr lang="es-CO"/>
           </a:p>
@@ -690,7 +689,7 @@
           <a:p>
             <a:fld id="{34B299F4-7090-4AF8-8998-804EDB480267}" type="datetimeFigureOut">
               <a:rPr lang="es-CO" smtClean="0"/>
-              <a:t>11/09/2018</a:t>
+              <a:t>21/09/2018</a:t>
             </a:fld>
             <a:endParaRPr lang="es-CO"/>
           </a:p>
@@ -890,7 +889,7 @@
           <a:p>
             <a:fld id="{34B299F4-7090-4AF8-8998-804EDB480267}" type="datetimeFigureOut">
               <a:rPr lang="es-CO" smtClean="0"/>
-              <a:t>11/09/2018</a:t>
+              <a:t>21/09/2018</a:t>
             </a:fld>
             <a:endParaRPr lang="es-CO"/>
           </a:p>
@@ -1166,7 +1165,7 @@
           <a:p>
             <a:fld id="{34B299F4-7090-4AF8-8998-804EDB480267}" type="datetimeFigureOut">
               <a:rPr lang="es-CO" smtClean="0"/>
-              <a:t>11/09/2018</a:t>
+              <a:t>21/09/2018</a:t>
             </a:fld>
             <a:endParaRPr lang="es-CO"/>
           </a:p>
@@ -1434,7 +1433,7 @@
           <a:p>
             <a:fld id="{34B299F4-7090-4AF8-8998-804EDB480267}" type="datetimeFigureOut">
               <a:rPr lang="es-CO" smtClean="0"/>
-              <a:t>11/09/2018</a:t>
+              <a:t>21/09/2018</a:t>
             </a:fld>
             <a:endParaRPr lang="es-CO"/>
           </a:p>
@@ -1849,7 +1848,7 @@
           <a:p>
             <a:fld id="{34B299F4-7090-4AF8-8998-804EDB480267}" type="datetimeFigureOut">
               <a:rPr lang="es-CO" smtClean="0"/>
-              <a:t>11/09/2018</a:t>
+              <a:t>21/09/2018</a:t>
             </a:fld>
             <a:endParaRPr lang="es-CO"/>
           </a:p>
@@ -1991,7 +1990,7 @@
           <a:p>
             <a:fld id="{34B299F4-7090-4AF8-8998-804EDB480267}" type="datetimeFigureOut">
               <a:rPr lang="es-CO" smtClean="0"/>
-              <a:t>11/09/2018</a:t>
+              <a:t>21/09/2018</a:t>
             </a:fld>
             <a:endParaRPr lang="es-CO"/>
           </a:p>
@@ -2104,7 +2103,7 @@
           <a:p>
             <a:fld id="{34B299F4-7090-4AF8-8998-804EDB480267}" type="datetimeFigureOut">
               <a:rPr lang="es-CO" smtClean="0"/>
-              <a:t>11/09/2018</a:t>
+              <a:t>21/09/2018</a:t>
             </a:fld>
             <a:endParaRPr lang="es-CO"/>
           </a:p>
@@ -2417,7 +2416,7 @@
           <a:p>
             <a:fld id="{34B299F4-7090-4AF8-8998-804EDB480267}" type="datetimeFigureOut">
               <a:rPr lang="es-CO" smtClean="0"/>
-              <a:t>11/09/2018</a:t>
+              <a:t>21/09/2018</a:t>
             </a:fld>
             <a:endParaRPr lang="es-CO"/>
           </a:p>
@@ -2706,7 +2705,7 @@
           <a:p>
             <a:fld id="{34B299F4-7090-4AF8-8998-804EDB480267}" type="datetimeFigureOut">
               <a:rPr lang="es-CO" smtClean="0"/>
-              <a:t>11/09/2018</a:t>
+              <a:t>21/09/2018</a:t>
             </a:fld>
             <a:endParaRPr lang="es-CO"/>
           </a:p>
@@ -2949,7 +2948,7 @@
           <a:p>
             <a:fld id="{34B299F4-7090-4AF8-8998-804EDB480267}" type="datetimeFigureOut">
               <a:rPr lang="es-CO" smtClean="0"/>
-              <a:t>11/09/2018</a:t>
+              <a:t>21/09/2018</a:t>
             </a:fld>
             <a:endParaRPr lang="es-CO"/>
           </a:p>
@@ -4203,15 +4202,24 @@
           <a:p>
             <a:pPr algn="ctr"/>
             <a:r>
-              <a:rPr lang="en-US" dirty="0"/>
-              <a:t>Ratings_1_2_3</a:t>
-            </a:r>
+              <a:rPr lang="en-US" dirty="0" err="1"/>
+              <a:t>cbf_r</a:t>
+            </a:r>
+            <a:endParaRPr lang="en-US" dirty="0"/>
           </a:p>
           <a:p>
             <a:pPr algn="ctr"/>
             <a:r>
-              <a:rPr lang="en-US" dirty="0"/>
-              <a:t>Ratings_4</a:t>
+              <a:rPr lang="en-US" dirty="0" err="1"/>
+              <a:t>fact_r</a:t>
+            </a:r>
+            <a:endParaRPr lang="en-US" dirty="0"/>
+          </a:p>
+          <a:p>
+            <a:pPr algn="ctr"/>
+            <a:r>
+              <a:rPr lang="en-US" dirty="0" err="1"/>
+              <a:t>nonpers_r</a:t>
             </a:r>
             <a:endParaRPr lang="es-CO" dirty="0"/>
           </a:p>
@@ -4660,600 +4668,6 @@
             </a:r>
             <a:r>
               <a:rPr lang="en-US" dirty="0" err="1"/>
-              <a:t>Mostrar</a:t>
-            </a:r>
-            <a:r>
-              <a:rPr lang="en-US" dirty="0"/>
-              <a:t> </a:t>
-            </a:r>
-            <a:r>
-              <a:rPr lang="en-US" dirty="0" err="1"/>
-              <a:t>Apartamento</a:t>
-            </a:r>
-            <a:r>
-              <a:rPr lang="en-US" dirty="0"/>
-              <a:t>)</a:t>
-            </a:r>
-            <a:endParaRPr lang="es-CO" dirty="0"/>
-          </a:p>
-        </p:txBody>
-      </p:sp>
-      <p:sp>
-        <p:nvSpPr>
-          <p:cNvPr id="2" name="Diagrama de flujo: proceso predefinido 1">
-            <a:extLst>
-              <a:ext uri="{FF2B5EF4-FFF2-40B4-BE49-F238E27FC236}">
-                <a16:creationId xmlns:a16="http://schemas.microsoft.com/office/drawing/2014/main" id="{31C09B22-195C-4A2E-9FB2-9D88F25F64B1}"/>
-              </a:ext>
-            </a:extLst>
-          </p:cNvPr>
-          <p:cNvSpPr/>
-          <p:nvPr/>
-        </p:nvSpPr>
-        <p:spPr>
-          <a:xfrm>
-            <a:off x="5086350" y="2688431"/>
-            <a:ext cx="2019300" cy="1033435"/>
-          </a:xfrm>
-          <a:prstGeom prst="flowChartPredefinedProcess">
-            <a:avLst/>
-          </a:prstGeom>
-          <a:noFill/>
-          <a:ln>
-            <a:solidFill>
-              <a:schemeClr val="accent4">
-                <a:lumMod val="75000"/>
-              </a:schemeClr>
-            </a:solidFill>
-          </a:ln>
-        </p:spPr>
-        <p:style>
-          <a:lnRef idx="2">
-            <a:schemeClr val="accent1">
-              <a:shade val="50000"/>
-            </a:schemeClr>
-          </a:lnRef>
-          <a:fillRef idx="1">
-            <a:schemeClr val="accent1"/>
-          </a:fillRef>
-          <a:effectRef idx="0">
-            <a:schemeClr val="accent1"/>
-          </a:effectRef>
-          <a:fontRef idx="minor">
-            <a:schemeClr val="lt1"/>
-          </a:fontRef>
-        </p:style>
-        <p:txBody>
-          <a:bodyPr rtlCol="0" anchor="ctr"/>
-          <a:lstStyle/>
-          <a:p>
-            <a:pPr algn="ctr"/>
-            <a:r>
-              <a:rPr lang="en-US" sz="1200" dirty="0" err="1">
-                <a:solidFill>
-                  <a:schemeClr val="tx1"/>
-                </a:solidFill>
-              </a:rPr>
-              <a:t>Mostrar_Fichas_aleatorias</a:t>
-            </a:r>
-            <a:endParaRPr lang="en-US" sz="1200" dirty="0">
-              <a:solidFill>
-                <a:schemeClr val="tx1"/>
-              </a:solidFill>
-            </a:endParaRPr>
-          </a:p>
-        </p:txBody>
-      </p:sp>
-      <p:sp>
-        <p:nvSpPr>
-          <p:cNvPr id="36" name="Diagrama de flujo: terminador 35">
-            <a:extLst>
-              <a:ext uri="{FF2B5EF4-FFF2-40B4-BE49-F238E27FC236}">
-                <a16:creationId xmlns:a16="http://schemas.microsoft.com/office/drawing/2014/main" id="{469FFF8E-671C-440C-A77E-75C2FD25319B}"/>
-              </a:ext>
-            </a:extLst>
-          </p:cNvPr>
-          <p:cNvSpPr/>
-          <p:nvPr/>
-        </p:nvSpPr>
-        <p:spPr>
-          <a:xfrm>
-            <a:off x="5355291" y="4106833"/>
-            <a:ext cx="1662112" cy="785812"/>
-          </a:xfrm>
-          <a:prstGeom prst="flowChartTerminator">
-            <a:avLst/>
-          </a:prstGeom>
-          <a:ln>
-            <a:solidFill>
-              <a:srgbClr val="92D050"/>
-            </a:solidFill>
-          </a:ln>
-        </p:spPr>
-        <p:style>
-          <a:lnRef idx="2">
-            <a:schemeClr val="accent4"/>
-          </a:lnRef>
-          <a:fillRef idx="1">
-            <a:schemeClr val="lt1"/>
-          </a:fillRef>
-          <a:effectRef idx="0">
-            <a:schemeClr val="accent4"/>
-          </a:effectRef>
-          <a:fontRef idx="minor">
-            <a:schemeClr val="dk1"/>
-          </a:fontRef>
-        </p:style>
-        <p:txBody>
-          <a:bodyPr rtlCol="0" anchor="ctr"/>
-          <a:lstStyle/>
-          <a:p>
-            <a:pPr algn="ctr"/>
-            <a:r>
-              <a:rPr lang="en-US" sz="1600" dirty="0"/>
-              <a:t>CSV (</a:t>
-            </a:r>
-            <a:r>
-              <a:rPr lang="en-US" sz="1600" dirty="0" err="1"/>
-              <a:t>Separado</a:t>
-            </a:r>
-            <a:r>
-              <a:rPr lang="en-US" sz="1600" dirty="0"/>
-              <a:t> por “;”) -Individual</a:t>
-            </a:r>
-            <a:endParaRPr lang="es-CO" sz="1600" dirty="0"/>
-          </a:p>
-        </p:txBody>
-      </p:sp>
-      <p:sp>
-        <p:nvSpPr>
-          <p:cNvPr id="8" name="Globo: flecha izquierda 7">
-            <a:extLst>
-              <a:ext uri="{FF2B5EF4-FFF2-40B4-BE49-F238E27FC236}">
-                <a16:creationId xmlns:a16="http://schemas.microsoft.com/office/drawing/2014/main" id="{C4686E9C-F5D0-4E75-93C7-C635F8EA496A}"/>
-              </a:ext>
-            </a:extLst>
-          </p:cNvPr>
-          <p:cNvSpPr/>
-          <p:nvPr/>
-        </p:nvSpPr>
-        <p:spPr>
-          <a:xfrm>
-            <a:off x="11157977" y="1162050"/>
-            <a:ext cx="661987" cy="1628775"/>
-          </a:xfrm>
-          <a:prstGeom prst="leftArrowCallout">
-            <a:avLst/>
-          </a:prstGeom>
-          <a:ln>
-            <a:solidFill>
-              <a:srgbClr val="FF0000"/>
-            </a:solidFill>
-          </a:ln>
-        </p:spPr>
-        <p:style>
-          <a:lnRef idx="2">
-            <a:schemeClr val="accent6"/>
-          </a:lnRef>
-          <a:fillRef idx="1">
-            <a:schemeClr val="lt1"/>
-          </a:fillRef>
-          <a:effectRef idx="0">
-            <a:schemeClr val="accent6"/>
-          </a:effectRef>
-          <a:fontRef idx="minor">
-            <a:schemeClr val="dk1"/>
-          </a:fontRef>
-        </p:style>
-        <p:txBody>
-          <a:bodyPr vert="vert270" rtlCol="0" anchor="ctr"/>
-          <a:lstStyle/>
-          <a:p>
-            <a:pPr algn="ctr"/>
-            <a:r>
-              <a:rPr lang="en-US" dirty="0"/>
-              <a:t>Entradas</a:t>
-            </a:r>
-            <a:endParaRPr lang="es-CO" dirty="0"/>
-          </a:p>
-        </p:txBody>
-      </p:sp>
-      <p:sp>
-        <p:nvSpPr>
-          <p:cNvPr id="37" name="Globo: flecha izquierda 36">
-            <a:extLst>
-              <a:ext uri="{FF2B5EF4-FFF2-40B4-BE49-F238E27FC236}">
-                <a16:creationId xmlns:a16="http://schemas.microsoft.com/office/drawing/2014/main" id="{FACD5601-1B77-499C-907B-651020E40E5F}"/>
-              </a:ext>
-            </a:extLst>
-          </p:cNvPr>
-          <p:cNvSpPr/>
-          <p:nvPr/>
-        </p:nvSpPr>
-        <p:spPr>
-          <a:xfrm>
-            <a:off x="11157975" y="4431506"/>
-            <a:ext cx="661987" cy="1628775"/>
-          </a:xfrm>
-          <a:prstGeom prst="leftArrowCallout">
-            <a:avLst/>
-          </a:prstGeom>
-        </p:spPr>
-        <p:style>
-          <a:lnRef idx="2">
-            <a:schemeClr val="accent6"/>
-          </a:lnRef>
-          <a:fillRef idx="1">
-            <a:schemeClr val="lt1"/>
-          </a:fillRef>
-          <a:effectRef idx="0">
-            <a:schemeClr val="accent6"/>
-          </a:effectRef>
-          <a:fontRef idx="minor">
-            <a:schemeClr val="dk1"/>
-          </a:fontRef>
-        </p:style>
-        <p:txBody>
-          <a:bodyPr vert="vert270" rtlCol="0" anchor="ctr"/>
-          <a:lstStyle/>
-          <a:p>
-            <a:pPr algn="ctr"/>
-            <a:r>
-              <a:rPr lang="en-US" dirty="0" err="1"/>
-              <a:t>Salidas</a:t>
-            </a:r>
-            <a:endParaRPr lang="es-CO" dirty="0"/>
-          </a:p>
-        </p:txBody>
-      </p:sp>
-      <p:sp>
-        <p:nvSpPr>
-          <p:cNvPr id="38" name="Globo: flecha izquierda 37">
-            <a:extLst>
-              <a:ext uri="{FF2B5EF4-FFF2-40B4-BE49-F238E27FC236}">
-                <a16:creationId xmlns:a16="http://schemas.microsoft.com/office/drawing/2014/main" id="{76940751-7CE2-4158-8FE3-B062E387FC5C}"/>
-              </a:ext>
-            </a:extLst>
-          </p:cNvPr>
-          <p:cNvSpPr/>
-          <p:nvPr/>
-        </p:nvSpPr>
-        <p:spPr>
-          <a:xfrm>
-            <a:off x="11157976" y="2802731"/>
-            <a:ext cx="661987" cy="1628775"/>
-          </a:xfrm>
-          <a:prstGeom prst="leftArrowCallout">
-            <a:avLst/>
-          </a:prstGeom>
-          <a:ln>
-            <a:solidFill>
-              <a:schemeClr val="accent4">
-                <a:lumMod val="75000"/>
-              </a:schemeClr>
-            </a:solidFill>
-          </a:ln>
-        </p:spPr>
-        <p:style>
-          <a:lnRef idx="2">
-            <a:schemeClr val="accent6"/>
-          </a:lnRef>
-          <a:fillRef idx="1">
-            <a:schemeClr val="lt1"/>
-          </a:fillRef>
-          <a:effectRef idx="0">
-            <a:schemeClr val="accent6"/>
-          </a:effectRef>
-          <a:fontRef idx="minor">
-            <a:schemeClr val="dk1"/>
-          </a:fontRef>
-        </p:style>
-        <p:txBody>
-          <a:bodyPr vert="vert270" rtlCol="0" anchor="ctr"/>
-          <a:lstStyle/>
-          <a:p>
-            <a:pPr algn="ctr"/>
-            <a:r>
-              <a:rPr lang="en-US" dirty="0" err="1"/>
-              <a:t>Funciones</a:t>
-            </a:r>
-            <a:endParaRPr lang="es-CO" dirty="0"/>
-          </a:p>
-        </p:txBody>
-      </p:sp>
-      <p:sp>
-        <p:nvSpPr>
-          <p:cNvPr id="40" name="Diagrama de flujo: terminador 39">
-            <a:extLst>
-              <a:ext uri="{FF2B5EF4-FFF2-40B4-BE49-F238E27FC236}">
-                <a16:creationId xmlns:a16="http://schemas.microsoft.com/office/drawing/2014/main" id="{BE5C8B2D-8CB1-4F2D-9AC1-E6DDDA21B085}"/>
-              </a:ext>
-            </a:extLst>
-          </p:cNvPr>
-          <p:cNvSpPr/>
-          <p:nvPr/>
-        </p:nvSpPr>
-        <p:spPr>
-          <a:xfrm>
-            <a:off x="5355291" y="5160169"/>
-            <a:ext cx="1662112" cy="785812"/>
-          </a:xfrm>
-          <a:prstGeom prst="flowChartTerminator">
-            <a:avLst/>
-          </a:prstGeom>
-          <a:ln>
-            <a:solidFill>
-              <a:srgbClr val="92D050"/>
-            </a:solidFill>
-          </a:ln>
-        </p:spPr>
-        <p:style>
-          <a:lnRef idx="2">
-            <a:schemeClr val="accent4"/>
-          </a:lnRef>
-          <a:fillRef idx="1">
-            <a:schemeClr val="lt1"/>
-          </a:fillRef>
-          <a:effectRef idx="0">
-            <a:schemeClr val="accent4"/>
-          </a:effectRef>
-          <a:fontRef idx="minor">
-            <a:schemeClr val="dk1"/>
-          </a:fontRef>
-        </p:style>
-        <p:txBody>
-          <a:bodyPr rtlCol="0" anchor="ctr"/>
-          <a:lstStyle/>
-          <a:p>
-            <a:pPr algn="ctr"/>
-            <a:r>
-              <a:rPr lang="en-US" sz="1600" dirty="0"/>
-              <a:t>INSERT _ </a:t>
-            </a:r>
-            <a:r>
-              <a:rPr lang="en-US" sz="1600" dirty="0" err="1"/>
-              <a:t>Tabla</a:t>
-            </a:r>
-            <a:r>
-              <a:rPr lang="en-US" sz="1600" dirty="0"/>
-              <a:t>_ RATINGS</a:t>
-            </a:r>
-            <a:endParaRPr lang="es-CO" sz="1600" dirty="0"/>
-          </a:p>
-        </p:txBody>
-      </p:sp>
-      <p:sp>
-        <p:nvSpPr>
-          <p:cNvPr id="15" name="Diagrama de flujo: terminador 14">
-            <a:extLst>
-              <a:ext uri="{FF2B5EF4-FFF2-40B4-BE49-F238E27FC236}">
-                <a16:creationId xmlns:a16="http://schemas.microsoft.com/office/drawing/2014/main" id="{44E411D2-2A91-4BD4-892E-6DCE8C1E5EA8}"/>
-              </a:ext>
-            </a:extLst>
-          </p:cNvPr>
-          <p:cNvSpPr/>
-          <p:nvPr/>
-        </p:nvSpPr>
-        <p:spPr>
-          <a:xfrm>
-            <a:off x="5264944" y="1525581"/>
-            <a:ext cx="1662112" cy="785812"/>
-          </a:xfrm>
-          <a:prstGeom prst="flowChartTerminator">
-            <a:avLst/>
-          </a:prstGeom>
-          <a:ln>
-            <a:solidFill>
-              <a:srgbClr val="FF0000"/>
-            </a:solidFill>
-          </a:ln>
-        </p:spPr>
-        <p:style>
-          <a:lnRef idx="2">
-            <a:schemeClr val="accent4"/>
-          </a:lnRef>
-          <a:fillRef idx="1">
-            <a:schemeClr val="lt1"/>
-          </a:fillRef>
-          <a:effectRef idx="0">
-            <a:schemeClr val="accent4"/>
-          </a:effectRef>
-          <a:fontRef idx="minor">
-            <a:schemeClr val="dk1"/>
-          </a:fontRef>
-        </p:style>
-        <p:txBody>
-          <a:bodyPr rtlCol="0" anchor="ctr"/>
-          <a:lstStyle/>
-          <a:p>
-            <a:pPr algn="ctr"/>
-            <a:r>
-              <a:rPr lang="en-US" sz="1600" dirty="0" err="1"/>
-              <a:t>Ficha</a:t>
-            </a:r>
-            <a:r>
-              <a:rPr lang="en-US" sz="1600" dirty="0"/>
-              <a:t> </a:t>
-            </a:r>
-            <a:r>
-              <a:rPr lang="en-US" sz="1600" dirty="0" err="1"/>
-              <a:t>en</a:t>
-            </a:r>
-            <a:r>
-              <a:rPr lang="en-US" sz="1600" dirty="0"/>
-              <a:t> HTML</a:t>
-            </a:r>
-            <a:endParaRPr lang="es-CO" sz="1600" dirty="0"/>
-          </a:p>
-        </p:txBody>
-      </p:sp>
-      <p:sp>
-        <p:nvSpPr>
-          <p:cNvPr id="16" name="Diagrama de flujo: documento 15">
-            <a:extLst>
-              <a:ext uri="{FF2B5EF4-FFF2-40B4-BE49-F238E27FC236}">
-                <a16:creationId xmlns:a16="http://schemas.microsoft.com/office/drawing/2014/main" id="{B9B92D79-EC93-4175-AE8F-D5761FD2AB37}"/>
-              </a:ext>
-            </a:extLst>
-          </p:cNvPr>
-          <p:cNvSpPr/>
-          <p:nvPr/>
-        </p:nvSpPr>
-        <p:spPr>
-          <a:xfrm>
-            <a:off x="7786124" y="4230686"/>
-            <a:ext cx="2216945" cy="523018"/>
-          </a:xfrm>
-          <a:prstGeom prst="flowChartDocument">
-            <a:avLst/>
-          </a:prstGeom>
-        </p:spPr>
-        <p:style>
-          <a:lnRef idx="2">
-            <a:schemeClr val="accent6"/>
-          </a:lnRef>
-          <a:fillRef idx="1">
-            <a:schemeClr val="lt1"/>
-          </a:fillRef>
-          <a:effectRef idx="0">
-            <a:schemeClr val="accent6"/>
-          </a:effectRef>
-          <a:fontRef idx="minor">
-            <a:schemeClr val="dk1"/>
-          </a:fontRef>
-        </p:style>
-        <p:txBody>
-          <a:bodyPr rtlCol="0" anchor="ctr"/>
-          <a:lstStyle/>
-          <a:p>
-            <a:pPr algn="ctr"/>
-            <a:r>
-              <a:rPr lang="es-CO" dirty="0"/>
-              <a:t>Rating_Client.csv</a:t>
-            </a:r>
-          </a:p>
-        </p:txBody>
-      </p:sp>
-    </p:spTree>
-    <p:extLst>
-      <p:ext uri="{BB962C8B-B14F-4D97-AF65-F5344CB8AC3E}">
-        <p14:creationId xmlns:p14="http://schemas.microsoft.com/office/powerpoint/2010/main" val="950132881"/>
-      </p:ext>
-    </p:extLst>
-  </p:cSld>
-  <p:clrMapOvr>
-    <a:masterClrMapping/>
-  </p:clrMapOvr>
-</p:sld>
-</file>
-
-<file path=ppt/slides/slide11.xml><?xml version="1.0" encoding="utf-8"?>
-<p:sld xmlns:a="http://schemas.openxmlformats.org/drawingml/2006/main" xmlns:r="http://schemas.openxmlformats.org/officeDocument/2006/relationships" xmlns:p="http://schemas.openxmlformats.org/presentationml/2006/main">
-  <p:cSld>
-    <p:spTree>
-      <p:nvGrpSpPr>
-        <p:cNvPr id="1" name=""/>
-        <p:cNvGrpSpPr/>
-        <p:nvPr/>
-      </p:nvGrpSpPr>
-      <p:grpSpPr>
-        <a:xfrm>
-          <a:off x="0" y="0"/>
-          <a:ext cx="0" cy="0"/>
-          <a:chOff x="0" y="0"/>
-          <a:chExt cx="0" cy="0"/>
-        </a:xfrm>
-      </p:grpSpPr>
-      <p:sp>
-        <p:nvSpPr>
-          <p:cNvPr id="4" name="CuadroTexto 3">
-            <a:extLst>
-              <a:ext uri="{FF2B5EF4-FFF2-40B4-BE49-F238E27FC236}">
-                <a16:creationId xmlns:a16="http://schemas.microsoft.com/office/drawing/2014/main" id="{6DFE3CFE-39D0-4F48-AA38-907E9F56CEBC}"/>
-              </a:ext>
-            </a:extLst>
-          </p:cNvPr>
-          <p:cNvSpPr txBox="1"/>
-          <p:nvPr/>
-        </p:nvSpPr>
-        <p:spPr>
-          <a:xfrm>
-            <a:off x="2752165" y="188259"/>
-            <a:ext cx="6687670" cy="707886"/>
-          </a:xfrm>
-          <a:prstGeom prst="rect">
-            <a:avLst/>
-          </a:prstGeom>
-          <a:noFill/>
-        </p:spPr>
-        <p:txBody>
-          <a:bodyPr wrap="square" rtlCol="0">
-            <a:spAutoFit/>
-          </a:bodyPr>
-          <a:lstStyle/>
-          <a:p>
-            <a:pPr algn="ctr"/>
-            <a:r>
-              <a:rPr lang="es-CO" sz="2000" dirty="0"/>
-              <a:t>DISEÑO DE ARQUITECTURA PARA IPR DEL SISTEMA DE RECOMENDACIÓN – DISENO WEB APPS </a:t>
-            </a:r>
-          </a:p>
-        </p:txBody>
-      </p:sp>
-      <p:sp>
-        <p:nvSpPr>
-          <p:cNvPr id="19" name="Rectángulo 18">
-            <a:extLst>
-              <a:ext uri="{FF2B5EF4-FFF2-40B4-BE49-F238E27FC236}">
-                <a16:creationId xmlns:a16="http://schemas.microsoft.com/office/drawing/2014/main" id="{3FD5B202-D10A-46AA-A175-845E800F758F}"/>
-              </a:ext>
-            </a:extLst>
-          </p:cNvPr>
-          <p:cNvSpPr/>
-          <p:nvPr/>
-        </p:nvSpPr>
-        <p:spPr>
-          <a:xfrm>
-            <a:off x="436331" y="1162050"/>
-            <a:ext cx="1595718" cy="5188196"/>
-          </a:xfrm>
-          <a:prstGeom prst="rect">
-            <a:avLst/>
-          </a:prstGeom>
-          <a:solidFill>
-            <a:schemeClr val="accent4">
-              <a:lumMod val="60000"/>
-              <a:lumOff val="40000"/>
-            </a:schemeClr>
-          </a:solidFill>
-        </p:spPr>
-        <p:style>
-          <a:lnRef idx="2">
-            <a:schemeClr val="accent1">
-              <a:shade val="50000"/>
-            </a:schemeClr>
-          </a:lnRef>
-          <a:fillRef idx="1">
-            <a:schemeClr val="accent1"/>
-          </a:fillRef>
-          <a:effectRef idx="0">
-            <a:schemeClr val="accent1"/>
-          </a:effectRef>
-          <a:fontRef idx="minor">
-            <a:schemeClr val="lt1"/>
-          </a:fontRef>
-        </p:style>
-        <p:txBody>
-          <a:bodyPr rtlCol="0" anchor="ctr"/>
-          <a:lstStyle/>
-          <a:p>
-            <a:pPr algn="ctr"/>
-            <a:r>
-              <a:rPr lang="en-US" dirty="0"/>
-              <a:t>Web APP (</a:t>
-            </a:r>
-            <a:r>
-              <a:rPr lang="en-US" dirty="0" err="1"/>
               <a:t>Seleccion</a:t>
             </a:r>
             <a:r>
@@ -5621,7 +5035,7 @@
 </p:sld>
 </file>
 
-<file path=ppt/slides/slide12.xml><?xml version="1.0" encoding="utf-8"?>
+<file path=ppt/slides/slide11.xml><?xml version="1.0" encoding="utf-8"?>
 <p:sld xmlns:a="http://schemas.openxmlformats.org/drawingml/2006/main" xmlns:r="http://schemas.openxmlformats.org/officeDocument/2006/relationships" xmlns:p="http://schemas.openxmlformats.org/presentationml/2006/main">
   <p:cSld>
     <p:spTree>
@@ -6418,16 +5832,6 @@
             <a:r>
               <a:rPr lang="es-CO" dirty="0"/>
               <a:t>Califica 8 distintos tipos de viviendas con un sistema de estrellas y te recomendaremos aquellas viviendas que mas se acerquen a las que te gustaron.</a:t>
-            </a:r>
-          </a:p>
-          <a:p>
-            <a:pPr marL="342900" indent="-342900" algn="ctr">
-              <a:buFontTx/>
-              <a:buAutoNum type="arabicPeriod"/>
-            </a:pPr>
-            <a:r>
-              <a:rPr lang="es-CO" dirty="0"/>
-              <a:t> Llena un formulario con tus datos personales y califica tres viviendas. Te recomendaremos aquellas viviendas que otras personas con un perfil parecido al tuyo han comprado o les ha gustado.</a:t>
             </a:r>
           </a:p>
           <a:p>
@@ -8995,6 +8399,18 @@
               <a:rPr lang="en-US" dirty="0" err="1"/>
               <a:t>Recomendacion</a:t>
             </a:r>
+            <a:r>
+              <a:rPr lang="en-US" dirty="0"/>
+              <a:t> (</a:t>
+            </a:r>
+            <a:r>
+              <a:rPr lang="en-US" dirty="0" err="1"/>
+              <a:t>cbf_r</a:t>
+            </a:r>
+            <a:r>
+              <a:rPr lang="en-US" dirty="0"/>
+              <a:t>)</a:t>
+            </a:r>
             <a:endParaRPr lang="es-CO" dirty="0"/>
           </a:p>
           <a:p>
@@ -9405,6 +8821,21 @@
               <a:rPr lang="en-US" dirty="0" err="1"/>
               <a:t>Recomendacion</a:t>
             </a:r>
+            <a:r>
+              <a:rPr lang="en-US" dirty="0"/>
+              <a:t> (</a:t>
+            </a:r>
+            <a:r>
+              <a:rPr lang="en-US" dirty="0" err="1"/>
+              <a:t>fact_r</a:t>
+            </a:r>
+            <a:r>
+              <a:rPr lang="en-US" dirty="0"/>
+              <a:t>)</a:t>
+            </a:r>
+          </a:p>
+          <a:p>
+            <a:pPr algn="ctr"/>
             <a:endParaRPr lang="es-CO" dirty="0"/>
           </a:p>
           <a:p>
@@ -10045,2909 +9476,6 @@
         </p:nvSpPr>
         <p:spPr>
           <a:xfrm>
-            <a:off x="111609" y="2918012"/>
-            <a:ext cx="1101425" cy="739587"/>
-          </a:xfrm>
-          <a:prstGeom prst="rect">
-            <a:avLst/>
-          </a:prstGeom>
-        </p:spPr>
-        <p:style>
-          <a:lnRef idx="2">
-            <a:schemeClr val="accent1">
-              <a:shade val="50000"/>
-            </a:schemeClr>
-          </a:lnRef>
-          <a:fillRef idx="1">
-            <a:schemeClr val="accent1"/>
-          </a:fillRef>
-          <a:effectRef idx="0">
-            <a:schemeClr val="accent1"/>
-          </a:effectRef>
-          <a:fontRef idx="minor">
-            <a:schemeClr val="lt1"/>
-          </a:fontRef>
-        </p:style>
-        <p:txBody>
-          <a:bodyPr rtlCol="0" anchor="ctr"/>
-          <a:lstStyle/>
-          <a:p>
-            <a:pPr algn="ctr"/>
-            <a:endParaRPr lang="en-US" dirty="0"/>
-          </a:p>
-          <a:p>
-            <a:pPr algn="ctr"/>
-            <a:r>
-              <a:rPr lang="en-US" dirty="0"/>
-              <a:t>OPCION 3</a:t>
-            </a:r>
-            <a:endParaRPr lang="es-CO" dirty="0"/>
-          </a:p>
-          <a:p>
-            <a:pPr marL="342900" indent="-342900" algn="ctr">
-              <a:buAutoNum type="arabicPeriod"/>
-            </a:pPr>
-            <a:endParaRPr lang="es-CO" dirty="0"/>
-          </a:p>
-        </p:txBody>
-      </p:sp>
-      <p:cxnSp>
-        <p:nvCxnSpPr>
-          <p:cNvPr id="8" name="Conector recto de flecha 7">
-            <a:extLst>
-              <a:ext uri="{FF2B5EF4-FFF2-40B4-BE49-F238E27FC236}">
-                <a16:creationId xmlns:a16="http://schemas.microsoft.com/office/drawing/2014/main" id="{72D35A80-7E19-4FE0-B6C1-D5F531AD6969}"/>
-              </a:ext>
-            </a:extLst>
-          </p:cNvPr>
-          <p:cNvCxnSpPr>
-            <a:cxnSpLocks/>
-            <a:stCxn id="12" idx="3"/>
-          </p:cNvCxnSpPr>
-          <p:nvPr/>
-        </p:nvCxnSpPr>
-        <p:spPr>
-          <a:xfrm flipV="1">
-            <a:off x="1213034" y="3287805"/>
-            <a:ext cx="249054" cy="1"/>
-          </a:xfrm>
-          <a:prstGeom prst="straightConnector1">
-            <a:avLst/>
-          </a:prstGeom>
-          <a:ln>
-            <a:tailEnd type="triangle"/>
-          </a:ln>
-        </p:spPr>
-        <p:style>
-          <a:lnRef idx="1">
-            <a:schemeClr val="dk1"/>
-          </a:lnRef>
-          <a:fillRef idx="0">
-            <a:schemeClr val="dk1"/>
-          </a:fillRef>
-          <a:effectRef idx="0">
-            <a:schemeClr val="dk1"/>
-          </a:effectRef>
-          <a:fontRef idx="minor">
-            <a:schemeClr val="tx1"/>
-          </a:fontRef>
-        </p:style>
-      </p:cxnSp>
-      <p:sp>
-        <p:nvSpPr>
-          <p:cNvPr id="19" name="Rectángulo 18">
-            <a:extLst>
-              <a:ext uri="{FF2B5EF4-FFF2-40B4-BE49-F238E27FC236}">
-                <a16:creationId xmlns:a16="http://schemas.microsoft.com/office/drawing/2014/main" id="{3D42BB31-7D6E-4945-87DD-00F387A9431D}"/>
-              </a:ext>
-            </a:extLst>
-          </p:cNvPr>
-          <p:cNvSpPr/>
-          <p:nvPr/>
-        </p:nvSpPr>
-        <p:spPr>
-          <a:xfrm>
-            <a:off x="8868865" y="2721043"/>
-            <a:ext cx="1814565" cy="1698301"/>
-          </a:xfrm>
-          <a:prstGeom prst="rect">
-            <a:avLst/>
-          </a:prstGeom>
-          <a:solidFill>
-            <a:schemeClr val="accent6">
-              <a:lumMod val="60000"/>
-              <a:lumOff val="40000"/>
-            </a:schemeClr>
-          </a:solidFill>
-        </p:spPr>
-        <p:style>
-          <a:lnRef idx="2">
-            <a:schemeClr val="accent1">
-              <a:shade val="50000"/>
-            </a:schemeClr>
-          </a:lnRef>
-          <a:fillRef idx="1">
-            <a:schemeClr val="accent1"/>
-          </a:fillRef>
-          <a:effectRef idx="0">
-            <a:schemeClr val="accent1"/>
-          </a:effectRef>
-          <a:fontRef idx="minor">
-            <a:schemeClr val="lt1"/>
-          </a:fontRef>
-        </p:style>
-        <p:txBody>
-          <a:bodyPr rtlCol="0" anchor="ctr"/>
-          <a:lstStyle/>
-          <a:p>
-            <a:pPr algn="ctr"/>
-            <a:r>
-              <a:rPr lang="en-US" dirty="0"/>
-              <a:t>Salida del Sistema de </a:t>
-            </a:r>
-            <a:r>
-              <a:rPr lang="en-US" dirty="0" err="1"/>
-              <a:t>Recomendacion</a:t>
-            </a:r>
-            <a:endParaRPr lang="es-CO" dirty="0"/>
-          </a:p>
-          <a:p>
-            <a:pPr marL="342900" indent="-342900" algn="ctr">
-              <a:buAutoNum type="arabicPeriod"/>
-            </a:pPr>
-            <a:endParaRPr lang="es-CO" dirty="0"/>
-          </a:p>
-        </p:txBody>
-      </p:sp>
-      <p:cxnSp>
-        <p:nvCxnSpPr>
-          <p:cNvPr id="21" name="Conector recto de flecha 20">
-            <a:extLst>
-              <a:ext uri="{FF2B5EF4-FFF2-40B4-BE49-F238E27FC236}">
-                <a16:creationId xmlns:a16="http://schemas.microsoft.com/office/drawing/2014/main" id="{A46D3795-8487-4290-A259-C136FCDF733E}"/>
-              </a:ext>
-            </a:extLst>
-          </p:cNvPr>
-          <p:cNvCxnSpPr>
-            <a:cxnSpLocks/>
-            <a:stCxn id="13" idx="3"/>
-          </p:cNvCxnSpPr>
-          <p:nvPr/>
-        </p:nvCxnSpPr>
-        <p:spPr>
-          <a:xfrm flipV="1">
-            <a:off x="7971524" y="3509680"/>
-            <a:ext cx="819156" cy="1"/>
-          </a:xfrm>
-          <a:prstGeom prst="straightConnector1">
-            <a:avLst/>
-          </a:prstGeom>
-          <a:ln>
-            <a:tailEnd type="triangle"/>
-          </a:ln>
-        </p:spPr>
-        <p:style>
-          <a:lnRef idx="1">
-            <a:schemeClr val="dk1"/>
-          </a:lnRef>
-          <a:fillRef idx="0">
-            <a:schemeClr val="dk1"/>
-          </a:fillRef>
-          <a:effectRef idx="0">
-            <a:schemeClr val="dk1"/>
-          </a:effectRef>
-          <a:fontRef idx="minor">
-            <a:schemeClr val="tx1"/>
-          </a:fontRef>
-        </p:style>
-      </p:cxnSp>
-      <p:sp>
-        <p:nvSpPr>
-          <p:cNvPr id="22" name="Bocadillo nube: nube 21">
-            <a:extLst>
-              <a:ext uri="{FF2B5EF4-FFF2-40B4-BE49-F238E27FC236}">
-                <a16:creationId xmlns:a16="http://schemas.microsoft.com/office/drawing/2014/main" id="{03E7DF17-8A8A-47CD-B900-1F1CFE3D986B}"/>
-              </a:ext>
-            </a:extLst>
-          </p:cNvPr>
-          <p:cNvSpPr/>
-          <p:nvPr/>
-        </p:nvSpPr>
-        <p:spPr>
-          <a:xfrm>
-            <a:off x="6350861" y="1083828"/>
-            <a:ext cx="2035621" cy="1003918"/>
-          </a:xfrm>
-          <a:prstGeom prst="cloudCallout">
-            <a:avLst/>
-          </a:prstGeom>
-          <a:solidFill>
-            <a:schemeClr val="accent2"/>
-          </a:solidFill>
-        </p:spPr>
-        <p:style>
-          <a:lnRef idx="2">
-            <a:schemeClr val="accent1">
-              <a:shade val="50000"/>
-            </a:schemeClr>
-          </a:lnRef>
-          <a:fillRef idx="1">
-            <a:schemeClr val="accent1"/>
-          </a:fillRef>
-          <a:effectRef idx="0">
-            <a:schemeClr val="accent1"/>
-          </a:effectRef>
-          <a:fontRef idx="minor">
-            <a:schemeClr val="lt1"/>
-          </a:fontRef>
-        </p:style>
-        <p:txBody>
-          <a:bodyPr rtlCol="0" anchor="ctr"/>
-          <a:lstStyle/>
-          <a:p>
-            <a:pPr algn="ctr"/>
-            <a:r>
-              <a:rPr lang="en-US" sz="1200" dirty="0" err="1"/>
-              <a:t>Mostrar</a:t>
-            </a:r>
-            <a:r>
-              <a:rPr lang="en-US" sz="1200" dirty="0"/>
-              <a:t> UPZ mas </a:t>
-            </a:r>
-            <a:r>
-              <a:rPr lang="en-US" sz="1200" dirty="0" err="1"/>
-              <a:t>relevantes</a:t>
-            </a:r>
-            <a:r>
-              <a:rPr lang="en-US" sz="1200" dirty="0"/>
-              <a:t> para </a:t>
-            </a:r>
-            <a:r>
-              <a:rPr lang="en-US" sz="1200" dirty="0" err="1"/>
-              <a:t>cada</a:t>
-            </a:r>
-            <a:r>
-              <a:rPr lang="en-US" sz="1200" dirty="0"/>
-              <a:t> Zona </a:t>
-            </a:r>
-            <a:r>
-              <a:rPr lang="en-US" sz="1200" dirty="0" err="1"/>
-              <a:t>en</a:t>
-            </a:r>
-            <a:r>
-              <a:rPr lang="en-US" sz="1200" dirty="0"/>
-              <a:t> el </a:t>
-            </a:r>
-            <a:r>
-              <a:rPr lang="en-US" sz="1200" dirty="0" err="1"/>
-              <a:t>formulario</a:t>
-            </a:r>
-            <a:endParaRPr lang="es-CO" dirty="0"/>
-          </a:p>
-        </p:txBody>
-      </p:sp>
-      <p:graphicFrame>
-        <p:nvGraphicFramePr>
-          <p:cNvPr id="11" name="Tabla 10">
-            <a:extLst>
-              <a:ext uri="{FF2B5EF4-FFF2-40B4-BE49-F238E27FC236}">
-                <a16:creationId xmlns:a16="http://schemas.microsoft.com/office/drawing/2014/main" id="{2460F164-6A74-4DBB-9716-5CDE776F8A50}"/>
-              </a:ext>
-            </a:extLst>
-          </p:cNvPr>
-          <p:cNvGraphicFramePr>
-            <a:graphicFrameLocks noGrp="1"/>
-          </p:cNvGraphicFramePr>
-          <p:nvPr>
-            <p:extLst>
-              <p:ext uri="{D42A27DB-BD31-4B8C-83A1-F6EECF244321}">
-                <p14:modId xmlns:p14="http://schemas.microsoft.com/office/powerpoint/2010/main" val="1085749097"/>
-              </p:ext>
-            </p:extLst>
-          </p:nvPr>
-        </p:nvGraphicFramePr>
-        <p:xfrm>
-          <a:off x="2055948" y="1296827"/>
-          <a:ext cx="3873759" cy="4425708"/>
-        </p:xfrm>
-        <a:graphic>
-          <a:graphicData uri="http://schemas.openxmlformats.org/drawingml/2006/table">
-            <a:tbl>
-              <a:tblPr>
-                <a:tableStyleId>{5C22544A-7EE6-4342-B048-85BDC9FD1C3A}</a:tableStyleId>
-              </a:tblPr>
-              <a:tblGrid>
-                <a:gridCol w="575530">
-                  <a:extLst>
-                    <a:ext uri="{9D8B030D-6E8A-4147-A177-3AD203B41FA5}">
-                      <a16:colId xmlns:a16="http://schemas.microsoft.com/office/drawing/2014/main" val="2204874048"/>
-                    </a:ext>
-                  </a:extLst>
-                </a:gridCol>
-                <a:gridCol w="343104">
-                  <a:extLst>
-                    <a:ext uri="{9D8B030D-6E8A-4147-A177-3AD203B41FA5}">
-                      <a16:colId xmlns:a16="http://schemas.microsoft.com/office/drawing/2014/main" val="2663472236"/>
-                    </a:ext>
-                  </a:extLst>
-                </a:gridCol>
-                <a:gridCol w="1045915">
-                  <a:extLst>
-                    <a:ext uri="{9D8B030D-6E8A-4147-A177-3AD203B41FA5}">
-                      <a16:colId xmlns:a16="http://schemas.microsoft.com/office/drawing/2014/main" val="1387683573"/>
-                    </a:ext>
-                  </a:extLst>
-                </a:gridCol>
-                <a:gridCol w="1123390">
-                  <a:extLst>
-                    <a:ext uri="{9D8B030D-6E8A-4147-A177-3AD203B41FA5}">
-                      <a16:colId xmlns:a16="http://schemas.microsoft.com/office/drawing/2014/main" val="2363665950"/>
-                    </a:ext>
-                  </a:extLst>
-                </a:gridCol>
-                <a:gridCol w="785820">
-                  <a:extLst>
-                    <a:ext uri="{9D8B030D-6E8A-4147-A177-3AD203B41FA5}">
-                      <a16:colId xmlns:a16="http://schemas.microsoft.com/office/drawing/2014/main" val="567552150"/>
-                    </a:ext>
-                  </a:extLst>
-                </a:gridCol>
-              </a:tblGrid>
-              <a:tr h="79689">
-                <a:tc>
-                  <a:txBody>
-                    <a:bodyPr/>
-                    <a:lstStyle/>
-                    <a:p>
-                      <a:pPr algn="ctr" fontAlgn="ctr"/>
-                      <a:r>
-                        <a:rPr lang="es-CO" sz="500" u="none" strike="noStrike">
-                          <a:effectLst/>
-                        </a:rPr>
-                        <a:t>NOMBRE</a:t>
-                      </a:r>
-                      <a:endParaRPr lang="es-CO" sz="500" b="1" i="0" u="none" strike="noStrike">
-                        <a:solidFill>
-                          <a:srgbClr val="000000"/>
-                        </a:solidFill>
-                        <a:effectLst/>
-                        <a:latin typeface="Calibri" panose="020F0502020204030204" pitchFamily="34" charset="0"/>
-                      </a:endParaRPr>
-                    </a:p>
-                  </a:txBody>
-                  <a:tcPr marL="1660" marR="1660" marT="1660" marB="0" anchor="ctr"/>
-                </a:tc>
-                <a:tc>
-                  <a:txBody>
-                    <a:bodyPr/>
-                    <a:lstStyle/>
-                    <a:p>
-                      <a:pPr algn="ctr" fontAlgn="ctr"/>
-                      <a:r>
-                        <a:rPr lang="es-CO" sz="500" u="none" strike="noStrike">
-                          <a:effectLst/>
-                        </a:rPr>
-                        <a:t>TIPO</a:t>
-                      </a:r>
-                      <a:endParaRPr lang="es-CO" sz="500" b="1" i="0" u="none" strike="noStrike">
-                        <a:solidFill>
-                          <a:srgbClr val="000000"/>
-                        </a:solidFill>
-                        <a:effectLst/>
-                        <a:latin typeface="Calibri" panose="020F0502020204030204" pitchFamily="34" charset="0"/>
-                      </a:endParaRPr>
-                    </a:p>
-                  </a:txBody>
-                  <a:tcPr marL="1660" marR="1660" marT="1660" marB="0" anchor="ctr"/>
-                </a:tc>
-                <a:tc>
-                  <a:txBody>
-                    <a:bodyPr/>
-                    <a:lstStyle/>
-                    <a:p>
-                      <a:pPr algn="ctr" fontAlgn="ctr"/>
-                      <a:r>
-                        <a:rPr lang="es-CO" sz="500" u="none" strike="noStrike">
-                          <a:effectLst/>
-                        </a:rPr>
-                        <a:t>FORMULARIO WEB</a:t>
-                      </a:r>
-                      <a:endParaRPr lang="es-CO" sz="500" b="1" i="0" u="none" strike="noStrike">
-                        <a:solidFill>
-                          <a:srgbClr val="000000"/>
-                        </a:solidFill>
-                        <a:effectLst/>
-                        <a:latin typeface="Calibri" panose="020F0502020204030204" pitchFamily="34" charset="0"/>
-                      </a:endParaRPr>
-                    </a:p>
-                  </a:txBody>
-                  <a:tcPr marL="1660" marR="1660" marT="1660" marB="0" anchor="ctr"/>
-                </a:tc>
-                <a:tc>
-                  <a:txBody>
-                    <a:bodyPr/>
-                    <a:lstStyle/>
-                    <a:p>
-                      <a:pPr algn="ctr" fontAlgn="ctr"/>
-                      <a:r>
-                        <a:rPr lang="es-CO" sz="500" u="none" strike="noStrike">
-                          <a:effectLst/>
-                        </a:rPr>
-                        <a:t>VALORES</a:t>
-                      </a:r>
-                      <a:endParaRPr lang="es-CO" sz="500" b="1" i="0" u="none" strike="noStrike">
-                        <a:solidFill>
-                          <a:srgbClr val="000000"/>
-                        </a:solidFill>
-                        <a:effectLst/>
-                        <a:latin typeface="Calibri" panose="020F0502020204030204" pitchFamily="34" charset="0"/>
-                      </a:endParaRPr>
-                    </a:p>
-                  </a:txBody>
-                  <a:tcPr marL="1660" marR="1660" marT="1660" marB="0" anchor="ctr"/>
-                </a:tc>
-                <a:tc>
-                  <a:txBody>
-                    <a:bodyPr/>
-                    <a:lstStyle/>
-                    <a:p>
-                      <a:pPr algn="ctr" fontAlgn="ctr"/>
-                      <a:r>
-                        <a:rPr lang="es-CO" sz="500" u="none" strike="noStrike">
-                          <a:effectLst/>
-                        </a:rPr>
-                        <a:t>SIGNIFICADO</a:t>
-                      </a:r>
-                      <a:endParaRPr lang="es-CO" sz="500" b="1" i="0" u="none" strike="noStrike">
-                        <a:solidFill>
-                          <a:srgbClr val="000000"/>
-                        </a:solidFill>
-                        <a:effectLst/>
-                        <a:latin typeface="Calibri" panose="020F0502020204030204" pitchFamily="34" charset="0"/>
-                      </a:endParaRPr>
-                    </a:p>
-                  </a:txBody>
-                  <a:tcPr marL="1660" marR="1660" marT="1660" marB="0" anchor="ctr"/>
-                </a:tc>
-                <a:extLst>
-                  <a:ext uri="{0D108BD9-81ED-4DB2-BD59-A6C34878D82A}">
-                    <a16:rowId xmlns:a16="http://schemas.microsoft.com/office/drawing/2014/main" val="113981244"/>
-                  </a:ext>
-                </a:extLst>
-              </a:tr>
-              <a:tr h="79689">
-                <a:tc>
-                  <a:txBody>
-                    <a:bodyPr/>
-                    <a:lstStyle/>
-                    <a:p>
-                      <a:pPr algn="ctr" fontAlgn="b"/>
-                      <a:r>
-                        <a:rPr lang="es-CO" sz="500" u="none" strike="noStrike">
-                          <a:effectLst/>
-                        </a:rPr>
-                        <a:t>ID_C</a:t>
-                      </a:r>
-                      <a:endParaRPr lang="es-CO" sz="500" b="0" i="0" u="none" strike="noStrike">
-                        <a:solidFill>
-                          <a:srgbClr val="000000"/>
-                        </a:solidFill>
-                        <a:effectLst/>
-                        <a:latin typeface="Calibri" panose="020F0502020204030204" pitchFamily="34" charset="0"/>
-                      </a:endParaRPr>
-                    </a:p>
-                  </a:txBody>
-                  <a:tcPr marL="1660" marR="1660" marT="1660" marB="0" anchor="b"/>
-                </a:tc>
-                <a:tc>
-                  <a:txBody>
-                    <a:bodyPr/>
-                    <a:lstStyle/>
-                    <a:p>
-                      <a:pPr algn="ctr" fontAlgn="ctr"/>
-                      <a:r>
-                        <a:rPr lang="es-CO" sz="500" u="none" strike="noStrike">
-                          <a:effectLst/>
-                        </a:rPr>
-                        <a:t>Int</a:t>
-                      </a:r>
-                      <a:endParaRPr lang="es-CO" sz="500" b="0" i="0" u="none" strike="noStrike">
-                        <a:solidFill>
-                          <a:srgbClr val="000000"/>
-                        </a:solidFill>
-                        <a:effectLst/>
-                        <a:latin typeface="Calibri" panose="020F0502020204030204" pitchFamily="34" charset="0"/>
-                      </a:endParaRPr>
-                    </a:p>
-                  </a:txBody>
-                  <a:tcPr marL="1660" marR="1660" marT="1660" marB="0" anchor="ctr"/>
-                </a:tc>
-                <a:tc>
-                  <a:txBody>
-                    <a:bodyPr/>
-                    <a:lstStyle/>
-                    <a:p>
-                      <a:pPr algn="ctr" fontAlgn="b"/>
-                      <a:r>
-                        <a:rPr lang="es-CO" sz="500" u="none" strike="noStrike">
-                          <a:effectLst/>
-                        </a:rPr>
-                        <a:t>N.A</a:t>
-                      </a:r>
-                      <a:endParaRPr lang="es-CO" sz="500" b="0" i="0" u="none" strike="noStrike">
-                        <a:solidFill>
-                          <a:srgbClr val="000000"/>
-                        </a:solidFill>
-                        <a:effectLst/>
-                        <a:latin typeface="Calibri" panose="020F0502020204030204" pitchFamily="34" charset="0"/>
-                      </a:endParaRPr>
-                    </a:p>
-                  </a:txBody>
-                  <a:tcPr marL="1660" marR="1660" marT="1660" marB="0" anchor="b"/>
-                </a:tc>
-                <a:tc>
-                  <a:txBody>
-                    <a:bodyPr/>
-                    <a:lstStyle/>
-                    <a:p>
-                      <a:pPr algn="l" fontAlgn="b"/>
-                      <a:r>
-                        <a:rPr lang="es-CO" sz="500" u="none" strike="noStrike">
-                          <a:effectLst/>
-                        </a:rPr>
-                        <a:t>Asignado de Forma Consecutiva por Sistema</a:t>
-                      </a:r>
-                      <a:endParaRPr lang="es-CO" sz="500" b="0" i="0" u="none" strike="noStrike">
-                        <a:solidFill>
-                          <a:srgbClr val="000000"/>
-                        </a:solidFill>
-                        <a:effectLst/>
-                        <a:latin typeface="Calibri" panose="020F0502020204030204" pitchFamily="34" charset="0"/>
-                      </a:endParaRPr>
-                    </a:p>
-                  </a:txBody>
-                  <a:tcPr marL="1660" marR="1660" marT="1660" marB="0" anchor="b"/>
-                </a:tc>
-                <a:tc>
-                  <a:txBody>
-                    <a:bodyPr/>
-                    <a:lstStyle/>
-                    <a:p>
-                      <a:pPr algn="ctr" fontAlgn="ctr"/>
-                      <a:r>
-                        <a:rPr lang="es-CO" sz="500" u="none" strike="noStrike">
-                          <a:effectLst/>
-                        </a:rPr>
-                        <a:t>Identificacion Unica del Cliente</a:t>
-                      </a:r>
-                      <a:endParaRPr lang="es-CO" sz="500" b="0" i="0" u="none" strike="noStrike">
-                        <a:solidFill>
-                          <a:srgbClr val="000000"/>
-                        </a:solidFill>
-                        <a:effectLst/>
-                        <a:latin typeface="Calibri" panose="020F0502020204030204" pitchFamily="34" charset="0"/>
-                      </a:endParaRPr>
-                    </a:p>
-                  </a:txBody>
-                  <a:tcPr marL="1660" marR="1660" marT="1660" marB="0" anchor="ctr"/>
-                </a:tc>
-                <a:extLst>
-                  <a:ext uri="{0D108BD9-81ED-4DB2-BD59-A6C34878D82A}">
-                    <a16:rowId xmlns:a16="http://schemas.microsoft.com/office/drawing/2014/main" val="437408901"/>
-                  </a:ext>
-                </a:extLst>
-              </a:tr>
-              <a:tr h="444929">
-                <a:tc>
-                  <a:txBody>
-                    <a:bodyPr/>
-                    <a:lstStyle/>
-                    <a:p>
-                      <a:pPr algn="ctr" fontAlgn="ctr"/>
-                      <a:r>
-                        <a:rPr lang="es-CO" sz="500" u="none" strike="noStrike">
-                          <a:effectLst/>
-                        </a:rPr>
-                        <a:t>Zona</a:t>
-                      </a:r>
-                      <a:endParaRPr lang="es-CO" sz="500" b="0" i="0" u="none" strike="noStrike">
-                        <a:solidFill>
-                          <a:srgbClr val="000000"/>
-                        </a:solidFill>
-                        <a:effectLst/>
-                        <a:latin typeface="Calibri" panose="020F0502020204030204" pitchFamily="34" charset="0"/>
-                      </a:endParaRPr>
-                    </a:p>
-                  </a:txBody>
-                  <a:tcPr marL="1660" marR="1660" marT="1660" marB="0" anchor="ctr"/>
-                </a:tc>
-                <a:tc>
-                  <a:txBody>
-                    <a:bodyPr/>
-                    <a:lstStyle/>
-                    <a:p>
-                      <a:pPr algn="ctr" fontAlgn="ctr"/>
-                      <a:r>
-                        <a:rPr lang="es-CO" sz="500" u="none" strike="noStrike">
-                          <a:effectLst/>
-                        </a:rPr>
-                        <a:t>Int</a:t>
-                      </a:r>
-                      <a:endParaRPr lang="es-CO" sz="500" b="0" i="0" u="none" strike="noStrike">
-                        <a:solidFill>
-                          <a:srgbClr val="000000"/>
-                        </a:solidFill>
-                        <a:effectLst/>
-                        <a:latin typeface="Calibri" panose="020F0502020204030204" pitchFamily="34" charset="0"/>
-                      </a:endParaRPr>
-                    </a:p>
-                  </a:txBody>
-                  <a:tcPr marL="1660" marR="1660" marT="1660" marB="0" anchor="ctr"/>
-                </a:tc>
-                <a:tc>
-                  <a:txBody>
-                    <a:bodyPr/>
-                    <a:lstStyle/>
-                    <a:p>
-                      <a:pPr algn="ctr" fontAlgn="b"/>
-                      <a:r>
-                        <a:rPr lang="es-CO" sz="500" u="none" strike="noStrike">
-                          <a:effectLst/>
-                        </a:rPr>
-                        <a:t>Selección Multiple (1: Norte 2: Nor-Occidente 3: Centro 4: Occidente 5: Sur-Occidente 6:Sur). Mostrar en JavaScript las UPZ mas relevantes al usuario. No puede quedar vacio.</a:t>
-                      </a:r>
-                      <a:endParaRPr lang="es-CO" sz="500" b="0" i="0" u="none" strike="noStrike">
-                        <a:solidFill>
-                          <a:srgbClr val="000000"/>
-                        </a:solidFill>
-                        <a:effectLst/>
-                        <a:latin typeface="Calibri" panose="020F0502020204030204" pitchFamily="34" charset="0"/>
-                      </a:endParaRPr>
-                    </a:p>
-                  </a:txBody>
-                  <a:tcPr marL="1660" marR="1660" marT="1660" marB="0" anchor="b"/>
-                </a:tc>
-                <a:tc>
-                  <a:txBody>
-                    <a:bodyPr/>
-                    <a:lstStyle/>
-                    <a:p>
-                      <a:pPr algn="ctr" fontAlgn="ctr"/>
-                      <a:r>
-                        <a:rPr lang="es-CO" sz="500" u="none" strike="noStrike">
-                          <a:effectLst/>
-                        </a:rPr>
-                        <a:t>1,2,3,4,5,6</a:t>
-                      </a:r>
-                      <a:endParaRPr lang="es-CO" sz="500" b="0" i="0" u="none" strike="noStrike">
-                        <a:solidFill>
-                          <a:srgbClr val="000000"/>
-                        </a:solidFill>
-                        <a:effectLst/>
-                        <a:latin typeface="Calibri" panose="020F0502020204030204" pitchFamily="34" charset="0"/>
-                      </a:endParaRPr>
-                    </a:p>
-                  </a:txBody>
-                  <a:tcPr marL="1660" marR="1660" marT="1660" marB="0" anchor="ctr"/>
-                </a:tc>
-                <a:tc>
-                  <a:txBody>
-                    <a:bodyPr/>
-                    <a:lstStyle/>
-                    <a:p>
-                      <a:pPr algn="ctr" fontAlgn="ctr"/>
-                      <a:r>
-                        <a:rPr lang="es-CO" sz="500" u="none" strike="noStrike">
-                          <a:effectLst/>
-                        </a:rPr>
-                        <a:t>Identificacion de la Zona donde desea vivir el cliente</a:t>
-                      </a:r>
-                      <a:endParaRPr lang="es-CO" sz="500" b="0" i="0" u="none" strike="noStrike">
-                        <a:solidFill>
-                          <a:srgbClr val="000000"/>
-                        </a:solidFill>
-                        <a:effectLst/>
-                        <a:latin typeface="Calibri" panose="020F0502020204030204" pitchFamily="34" charset="0"/>
-                      </a:endParaRPr>
-                    </a:p>
-                  </a:txBody>
-                  <a:tcPr marL="1660" marR="1660" marT="1660" marB="0" anchor="ctr"/>
-                </a:tc>
-                <a:extLst>
-                  <a:ext uri="{0D108BD9-81ED-4DB2-BD59-A6C34878D82A}">
-                    <a16:rowId xmlns:a16="http://schemas.microsoft.com/office/drawing/2014/main" val="467114395"/>
-                  </a:ext>
-                </a:extLst>
-              </a:tr>
-              <a:tr h="239066">
-                <a:tc>
-                  <a:txBody>
-                    <a:bodyPr/>
-                    <a:lstStyle/>
-                    <a:p>
-                      <a:pPr algn="ctr" fontAlgn="b"/>
-                      <a:r>
-                        <a:rPr lang="es-CO" sz="500" u="none" strike="noStrike">
-                          <a:effectLst/>
-                        </a:rPr>
-                        <a:t>Edad</a:t>
-                      </a:r>
-                      <a:endParaRPr lang="es-CO" sz="500" b="0" i="0" u="none" strike="noStrike">
-                        <a:solidFill>
-                          <a:srgbClr val="000000"/>
-                        </a:solidFill>
-                        <a:effectLst/>
-                        <a:latin typeface="Calibri" panose="020F0502020204030204" pitchFamily="34" charset="0"/>
-                      </a:endParaRPr>
-                    </a:p>
-                  </a:txBody>
-                  <a:tcPr marL="1660" marR="1660" marT="1660" marB="0" anchor="b"/>
-                </a:tc>
-                <a:tc>
-                  <a:txBody>
-                    <a:bodyPr/>
-                    <a:lstStyle/>
-                    <a:p>
-                      <a:pPr algn="ctr" fontAlgn="ctr"/>
-                      <a:r>
-                        <a:rPr lang="es-CO" sz="500" u="none" strike="noStrike">
-                          <a:effectLst/>
-                        </a:rPr>
-                        <a:t>Int</a:t>
-                      </a:r>
-                      <a:endParaRPr lang="es-CO" sz="500" b="0" i="0" u="none" strike="noStrike">
-                        <a:solidFill>
-                          <a:srgbClr val="000000"/>
-                        </a:solidFill>
-                        <a:effectLst/>
-                        <a:latin typeface="Calibri" panose="020F0502020204030204" pitchFamily="34" charset="0"/>
-                      </a:endParaRPr>
-                    </a:p>
-                  </a:txBody>
-                  <a:tcPr marL="1660" marR="1660" marT="1660" marB="0" anchor="ctr"/>
-                </a:tc>
-                <a:tc>
-                  <a:txBody>
-                    <a:bodyPr/>
-                    <a:lstStyle/>
-                    <a:p>
-                      <a:pPr algn="ctr" fontAlgn="ctr"/>
-                      <a:r>
-                        <a:rPr lang="es-CO" sz="500" u="none" strike="noStrike">
-                          <a:effectLst/>
-                        </a:rPr>
-                        <a:t>Seleccion Multiple (Entre 20 y 30, Entre 30 y 40, Entre 40 y 50, Entre 50 y 60, Mas de 60). No puede quedar vacio.</a:t>
-                      </a:r>
-                      <a:endParaRPr lang="es-CO" sz="500" b="0" i="0" u="none" strike="noStrike">
-                        <a:solidFill>
-                          <a:srgbClr val="000000"/>
-                        </a:solidFill>
-                        <a:effectLst/>
-                        <a:latin typeface="Calibri" panose="020F0502020204030204" pitchFamily="34" charset="0"/>
-                      </a:endParaRPr>
-                    </a:p>
-                  </a:txBody>
-                  <a:tcPr marL="1660" marR="1660" marT="1660" marB="0" anchor="ctr"/>
-                </a:tc>
-                <a:tc>
-                  <a:txBody>
-                    <a:bodyPr/>
-                    <a:lstStyle/>
-                    <a:p>
-                      <a:pPr algn="ctr" fontAlgn="ctr"/>
-                      <a:r>
-                        <a:rPr lang="es-CO" sz="500" u="none" strike="noStrike">
-                          <a:effectLst/>
-                        </a:rPr>
-                        <a:t>1,2,3,4,5</a:t>
-                      </a:r>
-                      <a:endParaRPr lang="es-CO" sz="500" b="0" i="0" u="none" strike="noStrike">
-                        <a:solidFill>
-                          <a:srgbClr val="000000"/>
-                        </a:solidFill>
-                        <a:effectLst/>
-                        <a:latin typeface="Calibri" panose="020F0502020204030204" pitchFamily="34" charset="0"/>
-                      </a:endParaRPr>
-                    </a:p>
-                  </a:txBody>
-                  <a:tcPr marL="1660" marR="1660" marT="1660" marB="0" anchor="ctr"/>
-                </a:tc>
-                <a:tc>
-                  <a:txBody>
-                    <a:bodyPr/>
-                    <a:lstStyle/>
-                    <a:p>
-                      <a:pPr algn="ctr" fontAlgn="ctr"/>
-                      <a:r>
-                        <a:rPr lang="es-CO" sz="500" u="none" strike="noStrike">
-                          <a:effectLst/>
-                        </a:rPr>
-                        <a:t>Identificacion Edad del Cliente</a:t>
-                      </a:r>
-                      <a:endParaRPr lang="es-CO" sz="500" b="0" i="0" u="none" strike="noStrike">
-                        <a:solidFill>
-                          <a:srgbClr val="000000"/>
-                        </a:solidFill>
-                        <a:effectLst/>
-                        <a:latin typeface="Calibri" panose="020F0502020204030204" pitchFamily="34" charset="0"/>
-                      </a:endParaRPr>
-                    </a:p>
-                  </a:txBody>
-                  <a:tcPr marL="1660" marR="1660" marT="1660" marB="0" anchor="ctr"/>
-                </a:tc>
-                <a:extLst>
-                  <a:ext uri="{0D108BD9-81ED-4DB2-BD59-A6C34878D82A}">
-                    <a16:rowId xmlns:a16="http://schemas.microsoft.com/office/drawing/2014/main" val="1846423185"/>
-                  </a:ext>
-                </a:extLst>
-              </a:tr>
-              <a:tr h="398444">
-                <a:tc>
-                  <a:txBody>
-                    <a:bodyPr/>
-                    <a:lstStyle/>
-                    <a:p>
-                      <a:pPr algn="ctr" fontAlgn="b"/>
-                      <a:r>
-                        <a:rPr lang="es-CO" sz="500" u="none" strike="noStrike">
-                          <a:effectLst/>
-                        </a:rPr>
-                        <a:t>Estado_Civil</a:t>
-                      </a:r>
-                      <a:endParaRPr lang="es-CO" sz="500" b="0" i="0" u="none" strike="noStrike">
-                        <a:solidFill>
-                          <a:srgbClr val="000000"/>
-                        </a:solidFill>
-                        <a:effectLst/>
-                        <a:latin typeface="Calibri" panose="020F0502020204030204" pitchFamily="34" charset="0"/>
-                      </a:endParaRPr>
-                    </a:p>
-                  </a:txBody>
-                  <a:tcPr marL="1660" marR="1660" marT="1660" marB="0" anchor="b"/>
-                </a:tc>
-                <a:tc>
-                  <a:txBody>
-                    <a:bodyPr/>
-                    <a:lstStyle/>
-                    <a:p>
-                      <a:pPr algn="ctr" fontAlgn="ctr"/>
-                      <a:r>
-                        <a:rPr lang="es-CO" sz="500" u="none" strike="noStrike">
-                          <a:effectLst/>
-                        </a:rPr>
-                        <a:t>Int</a:t>
-                      </a:r>
-                      <a:endParaRPr lang="es-CO" sz="500" b="0" i="0" u="none" strike="noStrike">
-                        <a:solidFill>
-                          <a:srgbClr val="000000"/>
-                        </a:solidFill>
-                        <a:effectLst/>
-                        <a:latin typeface="Calibri" panose="020F0502020204030204" pitchFamily="34" charset="0"/>
-                      </a:endParaRPr>
-                    </a:p>
-                  </a:txBody>
-                  <a:tcPr marL="1660" marR="1660" marT="1660" marB="0" anchor="ctr"/>
-                </a:tc>
-                <a:tc>
-                  <a:txBody>
-                    <a:bodyPr/>
-                    <a:lstStyle/>
-                    <a:p>
-                      <a:pPr algn="ctr" fontAlgn="ctr"/>
-                      <a:r>
-                        <a:rPr lang="es-CO" sz="500" u="none" strike="noStrike">
-                          <a:effectLst/>
-                        </a:rPr>
-                        <a:t>Seleccion Multiple (Soltero, Casado sin Hijos o Union Libre, Casado con Hijos, Divorciado o Viudo) No puede quedar vacio.</a:t>
-                      </a:r>
-                      <a:endParaRPr lang="es-CO" sz="500" b="0" i="0" u="none" strike="noStrike">
-                        <a:solidFill>
-                          <a:srgbClr val="000000"/>
-                        </a:solidFill>
-                        <a:effectLst/>
-                        <a:latin typeface="Calibri" panose="020F0502020204030204" pitchFamily="34" charset="0"/>
-                      </a:endParaRPr>
-                    </a:p>
-                  </a:txBody>
-                  <a:tcPr marL="1660" marR="1660" marT="1660" marB="0" anchor="ctr"/>
-                </a:tc>
-                <a:tc>
-                  <a:txBody>
-                    <a:bodyPr/>
-                    <a:lstStyle/>
-                    <a:p>
-                      <a:pPr algn="ctr" fontAlgn="ctr"/>
-                      <a:r>
-                        <a:rPr lang="es-CO" sz="500" u="none" strike="noStrike">
-                          <a:effectLst/>
-                        </a:rPr>
-                        <a:t>1,2,3,4</a:t>
-                      </a:r>
-                      <a:endParaRPr lang="es-CO" sz="500" b="0" i="0" u="none" strike="noStrike">
-                        <a:solidFill>
-                          <a:srgbClr val="000000"/>
-                        </a:solidFill>
-                        <a:effectLst/>
-                        <a:latin typeface="Calibri" panose="020F0502020204030204" pitchFamily="34" charset="0"/>
-                      </a:endParaRPr>
-                    </a:p>
-                  </a:txBody>
-                  <a:tcPr marL="1660" marR="1660" marT="1660" marB="0" anchor="ctr"/>
-                </a:tc>
-                <a:tc>
-                  <a:txBody>
-                    <a:bodyPr/>
-                    <a:lstStyle/>
-                    <a:p>
-                      <a:pPr algn="ctr" fontAlgn="ctr"/>
-                      <a:r>
-                        <a:rPr lang="es-CO" sz="500" u="none" strike="noStrike">
-                          <a:effectLst/>
-                        </a:rPr>
-                        <a:t>Identificacion Estado Civil del Cliente</a:t>
-                      </a:r>
-                      <a:endParaRPr lang="es-CO" sz="500" b="0" i="0" u="none" strike="noStrike">
-                        <a:solidFill>
-                          <a:srgbClr val="000000"/>
-                        </a:solidFill>
-                        <a:effectLst/>
-                        <a:latin typeface="Calibri" panose="020F0502020204030204" pitchFamily="34" charset="0"/>
-                      </a:endParaRPr>
-                    </a:p>
-                  </a:txBody>
-                  <a:tcPr marL="1660" marR="1660" marT="1660" marB="0" anchor="ctr"/>
-                </a:tc>
-                <a:extLst>
-                  <a:ext uri="{0D108BD9-81ED-4DB2-BD59-A6C34878D82A}">
-                    <a16:rowId xmlns:a16="http://schemas.microsoft.com/office/drawing/2014/main" val="2919418645"/>
-                  </a:ext>
-                </a:extLst>
-              </a:tr>
-              <a:tr h="398444">
-                <a:tc>
-                  <a:txBody>
-                    <a:bodyPr/>
-                    <a:lstStyle/>
-                    <a:p>
-                      <a:pPr algn="ctr" fontAlgn="b"/>
-                      <a:r>
-                        <a:rPr lang="es-CO" sz="500" u="none" strike="noStrike">
-                          <a:effectLst/>
-                        </a:rPr>
-                        <a:t>Ocupacion</a:t>
-                      </a:r>
-                      <a:endParaRPr lang="es-CO" sz="500" b="0" i="0" u="none" strike="noStrike">
-                        <a:solidFill>
-                          <a:srgbClr val="000000"/>
-                        </a:solidFill>
-                        <a:effectLst/>
-                        <a:latin typeface="Calibri" panose="020F0502020204030204" pitchFamily="34" charset="0"/>
-                      </a:endParaRPr>
-                    </a:p>
-                  </a:txBody>
-                  <a:tcPr marL="1660" marR="1660" marT="1660" marB="0" anchor="b"/>
-                </a:tc>
-                <a:tc>
-                  <a:txBody>
-                    <a:bodyPr/>
-                    <a:lstStyle/>
-                    <a:p>
-                      <a:pPr algn="ctr" fontAlgn="ctr"/>
-                      <a:r>
-                        <a:rPr lang="es-CO" sz="500" u="none" strike="noStrike">
-                          <a:effectLst/>
-                        </a:rPr>
-                        <a:t>Int</a:t>
-                      </a:r>
-                      <a:endParaRPr lang="es-CO" sz="500" b="0" i="0" u="none" strike="noStrike">
-                        <a:solidFill>
-                          <a:srgbClr val="000000"/>
-                        </a:solidFill>
-                        <a:effectLst/>
-                        <a:latin typeface="Calibri" panose="020F0502020204030204" pitchFamily="34" charset="0"/>
-                      </a:endParaRPr>
-                    </a:p>
-                  </a:txBody>
-                  <a:tcPr marL="1660" marR="1660" marT="1660" marB="0" anchor="ctr"/>
-                </a:tc>
-                <a:tc>
-                  <a:txBody>
-                    <a:bodyPr/>
-                    <a:lstStyle/>
-                    <a:p>
-                      <a:pPr algn="ctr" fontAlgn="ctr"/>
-                      <a:r>
-                        <a:rPr lang="es-CO" sz="500" u="none" strike="noStrike">
-                          <a:effectLst/>
-                        </a:rPr>
-                        <a:t>Seleccion Multiple (Estudiante, Empleado, Independiente, Rentista, Pensionado) No puede quedar vacio.</a:t>
-                      </a:r>
-                      <a:endParaRPr lang="es-CO" sz="500" b="0" i="0" u="none" strike="noStrike">
-                        <a:solidFill>
-                          <a:srgbClr val="000000"/>
-                        </a:solidFill>
-                        <a:effectLst/>
-                        <a:latin typeface="Calibri" panose="020F0502020204030204" pitchFamily="34" charset="0"/>
-                      </a:endParaRPr>
-                    </a:p>
-                  </a:txBody>
-                  <a:tcPr marL="1660" marR="1660" marT="1660" marB="0" anchor="ctr"/>
-                </a:tc>
-                <a:tc>
-                  <a:txBody>
-                    <a:bodyPr/>
-                    <a:lstStyle/>
-                    <a:p>
-                      <a:pPr algn="ctr" fontAlgn="ctr"/>
-                      <a:r>
-                        <a:rPr lang="es-CO" sz="500" u="none" strike="noStrike">
-                          <a:effectLst/>
-                        </a:rPr>
-                        <a:t>1,2,3,4,5</a:t>
-                      </a:r>
-                      <a:endParaRPr lang="es-CO" sz="500" b="0" i="0" u="none" strike="noStrike">
-                        <a:solidFill>
-                          <a:srgbClr val="000000"/>
-                        </a:solidFill>
-                        <a:effectLst/>
-                        <a:latin typeface="Calibri" panose="020F0502020204030204" pitchFamily="34" charset="0"/>
-                      </a:endParaRPr>
-                    </a:p>
-                  </a:txBody>
-                  <a:tcPr marL="1660" marR="1660" marT="1660" marB="0" anchor="ctr"/>
-                </a:tc>
-                <a:tc>
-                  <a:txBody>
-                    <a:bodyPr/>
-                    <a:lstStyle/>
-                    <a:p>
-                      <a:pPr algn="ctr" fontAlgn="ctr"/>
-                      <a:r>
-                        <a:rPr lang="es-CO" sz="500" u="none" strike="noStrike" dirty="0" err="1">
-                          <a:effectLst/>
-                        </a:rPr>
-                        <a:t>Identificacion</a:t>
-                      </a:r>
-                      <a:r>
-                        <a:rPr lang="es-CO" sz="500" u="none" strike="noStrike" dirty="0">
-                          <a:effectLst/>
-                        </a:rPr>
-                        <a:t> de la </a:t>
-                      </a:r>
-                      <a:r>
-                        <a:rPr lang="es-CO" sz="500" u="none" strike="noStrike" dirty="0" err="1">
-                          <a:effectLst/>
-                        </a:rPr>
-                        <a:t>Ocupacion</a:t>
-                      </a:r>
-                      <a:r>
-                        <a:rPr lang="es-CO" sz="500" u="none" strike="noStrike" dirty="0">
-                          <a:effectLst/>
-                        </a:rPr>
-                        <a:t> del Cliente</a:t>
-                      </a:r>
-                      <a:endParaRPr lang="es-CO" sz="500" b="0" i="0" u="none" strike="noStrike" dirty="0">
-                        <a:solidFill>
-                          <a:srgbClr val="000000"/>
-                        </a:solidFill>
-                        <a:effectLst/>
-                        <a:latin typeface="Calibri" panose="020F0502020204030204" pitchFamily="34" charset="0"/>
-                      </a:endParaRPr>
-                    </a:p>
-                  </a:txBody>
-                  <a:tcPr marL="1660" marR="1660" marT="1660" marB="0" anchor="ctr"/>
-                </a:tc>
-                <a:extLst>
-                  <a:ext uri="{0D108BD9-81ED-4DB2-BD59-A6C34878D82A}">
-                    <a16:rowId xmlns:a16="http://schemas.microsoft.com/office/drawing/2014/main" val="2666258802"/>
-                  </a:ext>
-                </a:extLst>
-              </a:tr>
-              <a:tr h="318755">
-                <a:tc>
-                  <a:txBody>
-                    <a:bodyPr/>
-                    <a:lstStyle/>
-                    <a:p>
-                      <a:pPr algn="ctr" fontAlgn="b"/>
-                      <a:r>
-                        <a:rPr lang="es-CO" sz="500" u="none" strike="noStrike">
-                          <a:effectLst/>
-                        </a:rPr>
-                        <a:t>Cant_Personas</a:t>
-                      </a:r>
-                      <a:endParaRPr lang="es-CO" sz="500" b="0" i="0" u="none" strike="noStrike">
-                        <a:solidFill>
-                          <a:srgbClr val="000000"/>
-                        </a:solidFill>
-                        <a:effectLst/>
-                        <a:latin typeface="Calibri" panose="020F0502020204030204" pitchFamily="34" charset="0"/>
-                      </a:endParaRPr>
-                    </a:p>
-                  </a:txBody>
-                  <a:tcPr marL="1660" marR="1660" marT="1660" marB="0" anchor="b"/>
-                </a:tc>
-                <a:tc>
-                  <a:txBody>
-                    <a:bodyPr/>
-                    <a:lstStyle/>
-                    <a:p>
-                      <a:pPr algn="ctr" fontAlgn="ctr"/>
-                      <a:r>
-                        <a:rPr lang="es-CO" sz="500" u="none" strike="noStrike">
-                          <a:effectLst/>
-                        </a:rPr>
-                        <a:t>Int</a:t>
-                      </a:r>
-                      <a:endParaRPr lang="es-CO" sz="500" b="0" i="0" u="none" strike="noStrike">
-                        <a:solidFill>
-                          <a:srgbClr val="000000"/>
-                        </a:solidFill>
-                        <a:effectLst/>
-                        <a:latin typeface="Calibri" panose="020F0502020204030204" pitchFamily="34" charset="0"/>
-                      </a:endParaRPr>
-                    </a:p>
-                  </a:txBody>
-                  <a:tcPr marL="1660" marR="1660" marT="1660" marB="0" anchor="ctr"/>
-                </a:tc>
-                <a:tc>
-                  <a:txBody>
-                    <a:bodyPr/>
-                    <a:lstStyle/>
-                    <a:p>
-                      <a:pPr algn="ctr" fontAlgn="ctr"/>
-                      <a:r>
-                        <a:rPr lang="es-CO" sz="500" u="none" strike="noStrike">
-                          <a:effectLst/>
-                        </a:rPr>
-                        <a:t>Entero Parametrizable (Entre 1 y 10). Validar Campo (No numeros negativos, ni cero, ni mas de 10). No puede quedar vacio.</a:t>
-                      </a:r>
-                      <a:endParaRPr lang="es-CO" sz="500" b="0" i="0" u="none" strike="noStrike">
-                        <a:solidFill>
-                          <a:srgbClr val="000000"/>
-                        </a:solidFill>
-                        <a:effectLst/>
-                        <a:latin typeface="Calibri" panose="020F0502020204030204" pitchFamily="34" charset="0"/>
-                      </a:endParaRPr>
-                    </a:p>
-                  </a:txBody>
-                  <a:tcPr marL="1660" marR="1660" marT="1660" marB="0" anchor="ctr"/>
-                </a:tc>
-                <a:tc>
-                  <a:txBody>
-                    <a:bodyPr/>
-                    <a:lstStyle/>
-                    <a:p>
-                      <a:pPr algn="ctr" fontAlgn="ctr"/>
-                      <a:r>
-                        <a:rPr lang="es-CO" sz="500" u="none" strike="noStrike">
-                          <a:effectLst/>
-                        </a:rPr>
-                        <a:t>Cant_Personas</a:t>
-                      </a:r>
-                      <a:endParaRPr lang="es-CO" sz="500" b="0" i="0" u="none" strike="noStrike">
-                        <a:solidFill>
-                          <a:srgbClr val="000000"/>
-                        </a:solidFill>
-                        <a:effectLst/>
-                        <a:latin typeface="Calibri" panose="020F0502020204030204" pitchFamily="34" charset="0"/>
-                      </a:endParaRPr>
-                    </a:p>
-                  </a:txBody>
-                  <a:tcPr marL="1660" marR="1660" marT="1660" marB="0" anchor="ctr"/>
-                </a:tc>
-                <a:tc>
-                  <a:txBody>
-                    <a:bodyPr/>
-                    <a:lstStyle/>
-                    <a:p>
-                      <a:pPr algn="ctr" fontAlgn="ctr"/>
-                      <a:r>
-                        <a:rPr lang="es-CO" sz="500" u="none" strike="noStrike">
-                          <a:effectLst/>
-                        </a:rPr>
-                        <a:t>Cantidad de Personas que viven en el hogar del Cliente incluyendolo</a:t>
-                      </a:r>
-                      <a:endParaRPr lang="es-CO" sz="500" b="0" i="0" u="none" strike="noStrike">
-                        <a:solidFill>
-                          <a:srgbClr val="000000"/>
-                        </a:solidFill>
-                        <a:effectLst/>
-                        <a:latin typeface="Calibri" panose="020F0502020204030204" pitchFamily="34" charset="0"/>
-                      </a:endParaRPr>
-                    </a:p>
-                  </a:txBody>
-                  <a:tcPr marL="1660" marR="1660" marT="1660" marB="0" anchor="ctr"/>
-                </a:tc>
-                <a:extLst>
-                  <a:ext uri="{0D108BD9-81ED-4DB2-BD59-A6C34878D82A}">
-                    <a16:rowId xmlns:a16="http://schemas.microsoft.com/office/drawing/2014/main" val="2807325383"/>
-                  </a:ext>
-                </a:extLst>
-              </a:tr>
-              <a:tr h="239066">
-                <a:tc>
-                  <a:txBody>
-                    <a:bodyPr/>
-                    <a:lstStyle/>
-                    <a:p>
-                      <a:pPr algn="ctr" fontAlgn="b"/>
-                      <a:r>
-                        <a:rPr lang="es-CO" sz="500" u="none" strike="noStrike">
-                          <a:effectLst/>
-                        </a:rPr>
-                        <a:t>Edad_hijo_Menor</a:t>
-                      </a:r>
-                      <a:endParaRPr lang="es-CO" sz="500" b="0" i="0" u="none" strike="noStrike">
-                        <a:solidFill>
-                          <a:srgbClr val="000000"/>
-                        </a:solidFill>
-                        <a:effectLst/>
-                        <a:latin typeface="Calibri" panose="020F0502020204030204" pitchFamily="34" charset="0"/>
-                      </a:endParaRPr>
-                    </a:p>
-                  </a:txBody>
-                  <a:tcPr marL="1660" marR="1660" marT="1660" marB="0" anchor="b"/>
-                </a:tc>
-                <a:tc>
-                  <a:txBody>
-                    <a:bodyPr/>
-                    <a:lstStyle/>
-                    <a:p>
-                      <a:pPr algn="ctr" fontAlgn="ctr"/>
-                      <a:r>
-                        <a:rPr lang="es-CO" sz="500" u="none" strike="noStrike">
-                          <a:effectLst/>
-                        </a:rPr>
-                        <a:t>Int</a:t>
-                      </a:r>
-                      <a:endParaRPr lang="es-CO" sz="500" b="0" i="0" u="none" strike="noStrike">
-                        <a:solidFill>
-                          <a:srgbClr val="000000"/>
-                        </a:solidFill>
-                        <a:effectLst/>
-                        <a:latin typeface="Calibri" panose="020F0502020204030204" pitchFamily="34" charset="0"/>
-                      </a:endParaRPr>
-                    </a:p>
-                  </a:txBody>
-                  <a:tcPr marL="1660" marR="1660" marT="1660" marB="0" anchor="ctr"/>
-                </a:tc>
-                <a:tc>
-                  <a:txBody>
-                    <a:bodyPr/>
-                    <a:lstStyle/>
-                    <a:p>
-                      <a:pPr algn="ctr" fontAlgn="ctr"/>
-                      <a:r>
-                        <a:rPr lang="es-CO" sz="500" u="none" strike="noStrike">
-                          <a:effectLst/>
-                        </a:rPr>
-                        <a:t>Seleccion Multiple (Entre 0 y 10 , Entre 10 y 20, Entre 20 y 30, Mas de 30, No tengo hijos). No puede quedar vacío.</a:t>
-                      </a:r>
-                      <a:endParaRPr lang="es-CO" sz="500" b="0" i="0" u="none" strike="noStrike">
-                        <a:solidFill>
-                          <a:srgbClr val="000000"/>
-                        </a:solidFill>
-                        <a:effectLst/>
-                        <a:latin typeface="Calibri" panose="020F0502020204030204" pitchFamily="34" charset="0"/>
-                      </a:endParaRPr>
-                    </a:p>
-                  </a:txBody>
-                  <a:tcPr marL="1660" marR="1660" marT="1660" marB="0" anchor="ctr"/>
-                </a:tc>
-                <a:tc>
-                  <a:txBody>
-                    <a:bodyPr/>
-                    <a:lstStyle/>
-                    <a:p>
-                      <a:pPr algn="ctr" fontAlgn="ctr"/>
-                      <a:r>
-                        <a:rPr lang="es-CO" sz="500" u="none" strike="noStrike">
-                          <a:effectLst/>
-                        </a:rPr>
-                        <a:t>1,2,3,3</a:t>
-                      </a:r>
-                      <a:endParaRPr lang="es-CO" sz="500" b="0" i="0" u="none" strike="noStrike">
-                        <a:solidFill>
-                          <a:srgbClr val="000000"/>
-                        </a:solidFill>
-                        <a:effectLst/>
-                        <a:latin typeface="Calibri" panose="020F0502020204030204" pitchFamily="34" charset="0"/>
-                      </a:endParaRPr>
-                    </a:p>
-                  </a:txBody>
-                  <a:tcPr marL="1660" marR="1660" marT="1660" marB="0" anchor="ctr"/>
-                </a:tc>
-                <a:tc>
-                  <a:txBody>
-                    <a:bodyPr/>
-                    <a:lstStyle/>
-                    <a:p>
-                      <a:pPr algn="ctr" fontAlgn="ctr"/>
-                      <a:r>
-                        <a:rPr lang="es-CO" sz="500" u="none" strike="noStrike">
-                          <a:effectLst/>
-                        </a:rPr>
-                        <a:t>Edad del Hijo Menor del Cliente</a:t>
-                      </a:r>
-                      <a:endParaRPr lang="es-CO" sz="500" b="0" i="0" u="none" strike="noStrike">
-                        <a:solidFill>
-                          <a:srgbClr val="000000"/>
-                        </a:solidFill>
-                        <a:effectLst/>
-                        <a:latin typeface="Calibri" panose="020F0502020204030204" pitchFamily="34" charset="0"/>
-                      </a:endParaRPr>
-                    </a:p>
-                  </a:txBody>
-                  <a:tcPr marL="1660" marR="1660" marT="1660" marB="0" anchor="ctr"/>
-                </a:tc>
-                <a:extLst>
-                  <a:ext uri="{0D108BD9-81ED-4DB2-BD59-A6C34878D82A}">
-                    <a16:rowId xmlns:a16="http://schemas.microsoft.com/office/drawing/2014/main" val="3097323991"/>
-                  </a:ext>
-                </a:extLst>
-              </a:tr>
-              <a:tr h="159377">
-                <a:tc>
-                  <a:txBody>
-                    <a:bodyPr/>
-                    <a:lstStyle/>
-                    <a:p>
-                      <a:pPr algn="ctr" fontAlgn="b"/>
-                      <a:r>
-                        <a:rPr lang="es-CO" sz="500" u="none" strike="noStrike">
-                          <a:effectLst/>
-                        </a:rPr>
-                        <a:t>Discapacidad</a:t>
-                      </a:r>
-                      <a:endParaRPr lang="es-CO" sz="500" b="0" i="0" u="none" strike="noStrike">
-                        <a:solidFill>
-                          <a:srgbClr val="000000"/>
-                        </a:solidFill>
-                        <a:effectLst/>
-                        <a:latin typeface="Calibri" panose="020F0502020204030204" pitchFamily="34" charset="0"/>
-                      </a:endParaRPr>
-                    </a:p>
-                  </a:txBody>
-                  <a:tcPr marL="1660" marR="1660" marT="1660" marB="0" anchor="b"/>
-                </a:tc>
-                <a:tc>
-                  <a:txBody>
-                    <a:bodyPr/>
-                    <a:lstStyle/>
-                    <a:p>
-                      <a:pPr algn="ctr" fontAlgn="ctr"/>
-                      <a:r>
-                        <a:rPr lang="es-CO" sz="500" u="none" strike="noStrike">
-                          <a:effectLst/>
-                        </a:rPr>
-                        <a:t>Binario</a:t>
-                      </a:r>
-                      <a:endParaRPr lang="es-CO" sz="500" b="0" i="0" u="none" strike="noStrike">
-                        <a:solidFill>
-                          <a:srgbClr val="000000"/>
-                        </a:solidFill>
-                        <a:effectLst/>
-                        <a:latin typeface="Calibri" panose="020F0502020204030204" pitchFamily="34" charset="0"/>
-                      </a:endParaRPr>
-                    </a:p>
-                  </a:txBody>
-                  <a:tcPr marL="1660" marR="1660" marT="1660" marB="0" anchor="ctr"/>
-                </a:tc>
-                <a:tc>
-                  <a:txBody>
-                    <a:bodyPr/>
-                    <a:lstStyle/>
-                    <a:p>
-                      <a:pPr algn="ctr" fontAlgn="ctr"/>
-                      <a:r>
-                        <a:rPr lang="es-CO" sz="500" u="none" strike="noStrike">
-                          <a:effectLst/>
-                        </a:rPr>
-                        <a:t>Seleccion Multiple (No, Si). No puede quedar vacio.</a:t>
-                      </a:r>
-                      <a:endParaRPr lang="es-CO" sz="500" b="0" i="0" u="none" strike="noStrike">
-                        <a:solidFill>
-                          <a:srgbClr val="000000"/>
-                        </a:solidFill>
-                        <a:effectLst/>
-                        <a:latin typeface="Calibri" panose="020F0502020204030204" pitchFamily="34" charset="0"/>
-                      </a:endParaRPr>
-                    </a:p>
-                  </a:txBody>
-                  <a:tcPr marL="1660" marR="1660" marT="1660" marB="0" anchor="ctr"/>
-                </a:tc>
-                <a:tc>
-                  <a:txBody>
-                    <a:bodyPr/>
-                    <a:lstStyle/>
-                    <a:p>
-                      <a:pPr algn="r" fontAlgn="b"/>
-                      <a:r>
-                        <a:rPr lang="es-CO" sz="500" u="none" strike="noStrike">
-                          <a:effectLst/>
-                        </a:rPr>
-                        <a:t>0,1</a:t>
-                      </a:r>
-                      <a:endParaRPr lang="es-CO" sz="500" b="0" i="0" u="none" strike="noStrike">
-                        <a:solidFill>
-                          <a:srgbClr val="000000"/>
-                        </a:solidFill>
-                        <a:effectLst/>
-                        <a:latin typeface="Calibri" panose="020F0502020204030204" pitchFamily="34" charset="0"/>
-                      </a:endParaRPr>
-                    </a:p>
-                  </a:txBody>
-                  <a:tcPr marL="1660" marR="1660" marT="1660" marB="0" anchor="b"/>
-                </a:tc>
-                <a:tc>
-                  <a:txBody>
-                    <a:bodyPr/>
-                    <a:lstStyle/>
-                    <a:p>
-                      <a:pPr algn="ctr" fontAlgn="b"/>
-                      <a:r>
-                        <a:rPr lang="es-CO" sz="500" u="none" strike="noStrike">
-                          <a:effectLst/>
-                        </a:rPr>
-                        <a:t>Existencia de Discapacidad en la Familia</a:t>
-                      </a:r>
-                      <a:endParaRPr lang="es-CO" sz="500" b="0" i="0" u="none" strike="noStrike">
-                        <a:solidFill>
-                          <a:srgbClr val="000000"/>
-                        </a:solidFill>
-                        <a:effectLst/>
-                        <a:latin typeface="Calibri" panose="020F0502020204030204" pitchFamily="34" charset="0"/>
-                      </a:endParaRPr>
-                    </a:p>
-                  </a:txBody>
-                  <a:tcPr marL="1660" marR="1660" marT="1660" marB="0" anchor="b"/>
-                </a:tc>
-                <a:extLst>
-                  <a:ext uri="{0D108BD9-81ED-4DB2-BD59-A6C34878D82A}">
-                    <a16:rowId xmlns:a16="http://schemas.microsoft.com/office/drawing/2014/main" val="1463148444"/>
-                  </a:ext>
-                </a:extLst>
-              </a:tr>
-              <a:tr h="159377">
-                <a:tc>
-                  <a:txBody>
-                    <a:bodyPr/>
-                    <a:lstStyle/>
-                    <a:p>
-                      <a:pPr algn="ctr" fontAlgn="b"/>
-                      <a:r>
-                        <a:rPr lang="es-CO" sz="500" u="none" strike="noStrike">
-                          <a:effectLst/>
-                        </a:rPr>
-                        <a:t>Mascota</a:t>
-                      </a:r>
-                      <a:endParaRPr lang="es-CO" sz="500" b="0" i="0" u="none" strike="noStrike">
-                        <a:solidFill>
-                          <a:srgbClr val="000000"/>
-                        </a:solidFill>
-                        <a:effectLst/>
-                        <a:latin typeface="Calibri" panose="020F0502020204030204" pitchFamily="34" charset="0"/>
-                      </a:endParaRPr>
-                    </a:p>
-                  </a:txBody>
-                  <a:tcPr marL="1660" marR="1660" marT="1660" marB="0" anchor="b"/>
-                </a:tc>
-                <a:tc>
-                  <a:txBody>
-                    <a:bodyPr/>
-                    <a:lstStyle/>
-                    <a:p>
-                      <a:pPr algn="ctr" fontAlgn="ctr"/>
-                      <a:r>
-                        <a:rPr lang="es-CO" sz="500" u="none" strike="noStrike">
-                          <a:effectLst/>
-                        </a:rPr>
-                        <a:t>Binario</a:t>
-                      </a:r>
-                      <a:endParaRPr lang="es-CO" sz="500" b="0" i="0" u="none" strike="noStrike">
-                        <a:solidFill>
-                          <a:srgbClr val="000000"/>
-                        </a:solidFill>
-                        <a:effectLst/>
-                        <a:latin typeface="Calibri" panose="020F0502020204030204" pitchFamily="34" charset="0"/>
-                      </a:endParaRPr>
-                    </a:p>
-                  </a:txBody>
-                  <a:tcPr marL="1660" marR="1660" marT="1660" marB="0" anchor="ctr"/>
-                </a:tc>
-                <a:tc>
-                  <a:txBody>
-                    <a:bodyPr/>
-                    <a:lstStyle/>
-                    <a:p>
-                      <a:pPr algn="ctr" fontAlgn="ctr"/>
-                      <a:r>
-                        <a:rPr lang="es-CO" sz="500" u="none" strike="noStrike">
-                          <a:effectLst/>
-                        </a:rPr>
-                        <a:t>Seleccion Multiple (No, Si). No puede quedar vacio.</a:t>
-                      </a:r>
-                      <a:endParaRPr lang="es-CO" sz="500" b="0" i="0" u="none" strike="noStrike">
-                        <a:solidFill>
-                          <a:srgbClr val="000000"/>
-                        </a:solidFill>
-                        <a:effectLst/>
-                        <a:latin typeface="Calibri" panose="020F0502020204030204" pitchFamily="34" charset="0"/>
-                      </a:endParaRPr>
-                    </a:p>
-                  </a:txBody>
-                  <a:tcPr marL="1660" marR="1660" marT="1660" marB="0" anchor="ctr"/>
-                </a:tc>
-                <a:tc>
-                  <a:txBody>
-                    <a:bodyPr/>
-                    <a:lstStyle/>
-                    <a:p>
-                      <a:pPr algn="r" fontAlgn="b"/>
-                      <a:r>
-                        <a:rPr lang="es-CO" sz="500" u="none" strike="noStrike">
-                          <a:effectLst/>
-                        </a:rPr>
-                        <a:t>0,1</a:t>
-                      </a:r>
-                      <a:endParaRPr lang="es-CO" sz="500" b="0" i="0" u="none" strike="noStrike">
-                        <a:solidFill>
-                          <a:srgbClr val="000000"/>
-                        </a:solidFill>
-                        <a:effectLst/>
-                        <a:latin typeface="Calibri" panose="020F0502020204030204" pitchFamily="34" charset="0"/>
-                      </a:endParaRPr>
-                    </a:p>
-                  </a:txBody>
-                  <a:tcPr marL="1660" marR="1660" marT="1660" marB="0" anchor="b"/>
-                </a:tc>
-                <a:tc>
-                  <a:txBody>
-                    <a:bodyPr/>
-                    <a:lstStyle/>
-                    <a:p>
-                      <a:pPr algn="ctr" fontAlgn="b"/>
-                      <a:r>
-                        <a:rPr lang="es-CO" sz="500" u="none" strike="noStrike">
-                          <a:effectLst/>
-                        </a:rPr>
-                        <a:t>Tenencia de Mascota por Parte del Cliente </a:t>
-                      </a:r>
-                      <a:endParaRPr lang="es-CO" sz="500" b="0" i="0" u="none" strike="noStrike">
-                        <a:solidFill>
-                          <a:srgbClr val="000000"/>
-                        </a:solidFill>
-                        <a:effectLst/>
-                        <a:latin typeface="Calibri" panose="020F0502020204030204" pitchFamily="34" charset="0"/>
-                      </a:endParaRPr>
-                    </a:p>
-                  </a:txBody>
-                  <a:tcPr marL="1660" marR="1660" marT="1660" marB="0" anchor="b"/>
-                </a:tc>
-                <a:extLst>
-                  <a:ext uri="{0D108BD9-81ED-4DB2-BD59-A6C34878D82A}">
-                    <a16:rowId xmlns:a16="http://schemas.microsoft.com/office/drawing/2014/main" val="1955102226"/>
-                  </a:ext>
-                </a:extLst>
-              </a:tr>
-              <a:tr h="318755">
-                <a:tc>
-                  <a:txBody>
-                    <a:bodyPr/>
-                    <a:lstStyle/>
-                    <a:p>
-                      <a:pPr algn="ctr" fontAlgn="b"/>
-                      <a:r>
-                        <a:rPr lang="es-CO" sz="500" u="none" strike="noStrike">
-                          <a:effectLst/>
-                        </a:rPr>
-                        <a:t>Vehiculo</a:t>
-                      </a:r>
-                      <a:endParaRPr lang="es-CO" sz="500" b="0" i="0" u="none" strike="noStrike">
-                        <a:solidFill>
-                          <a:srgbClr val="000000"/>
-                        </a:solidFill>
-                        <a:effectLst/>
-                        <a:latin typeface="Calibri" panose="020F0502020204030204" pitchFamily="34" charset="0"/>
-                      </a:endParaRPr>
-                    </a:p>
-                  </a:txBody>
-                  <a:tcPr marL="1660" marR="1660" marT="1660" marB="0" anchor="b"/>
-                </a:tc>
-                <a:tc>
-                  <a:txBody>
-                    <a:bodyPr/>
-                    <a:lstStyle/>
-                    <a:p>
-                      <a:pPr algn="ctr" fontAlgn="ctr"/>
-                      <a:r>
-                        <a:rPr lang="es-CO" sz="500" u="none" strike="noStrike">
-                          <a:effectLst/>
-                        </a:rPr>
-                        <a:t>Int</a:t>
-                      </a:r>
-                      <a:endParaRPr lang="es-CO" sz="500" b="0" i="0" u="none" strike="noStrike">
-                        <a:solidFill>
-                          <a:srgbClr val="000000"/>
-                        </a:solidFill>
-                        <a:effectLst/>
-                        <a:latin typeface="Calibri" panose="020F0502020204030204" pitchFamily="34" charset="0"/>
-                      </a:endParaRPr>
-                    </a:p>
-                  </a:txBody>
-                  <a:tcPr marL="1660" marR="1660" marT="1660" marB="0" anchor="ctr"/>
-                </a:tc>
-                <a:tc>
-                  <a:txBody>
-                    <a:bodyPr/>
-                    <a:lstStyle/>
-                    <a:p>
-                      <a:pPr algn="ctr" fontAlgn="ctr"/>
-                      <a:r>
-                        <a:rPr lang="es-CO" sz="500" u="none" strike="noStrike">
-                          <a:effectLst/>
-                        </a:rPr>
-                        <a:t>Entero Parametrizable (Entre 0 y 3). Validar Campo (No numeros negativos, ni cero, ni mas de 3). No puede quedar vacio.</a:t>
-                      </a:r>
-                      <a:endParaRPr lang="es-CO" sz="500" b="0" i="0" u="none" strike="noStrike">
-                        <a:solidFill>
-                          <a:srgbClr val="000000"/>
-                        </a:solidFill>
-                        <a:effectLst/>
-                        <a:latin typeface="Calibri" panose="020F0502020204030204" pitchFamily="34" charset="0"/>
-                      </a:endParaRPr>
-                    </a:p>
-                  </a:txBody>
-                  <a:tcPr marL="1660" marR="1660" marT="1660" marB="0" anchor="ctr"/>
-                </a:tc>
-                <a:tc>
-                  <a:txBody>
-                    <a:bodyPr/>
-                    <a:lstStyle/>
-                    <a:p>
-                      <a:pPr algn="ctr" fontAlgn="ctr"/>
-                      <a:r>
-                        <a:rPr lang="es-CO" sz="500" u="none" strike="noStrike">
-                          <a:effectLst/>
-                        </a:rPr>
-                        <a:t>Vehiculo</a:t>
-                      </a:r>
-                      <a:endParaRPr lang="es-CO" sz="500" b="0" i="0" u="none" strike="noStrike">
-                        <a:solidFill>
-                          <a:srgbClr val="000000"/>
-                        </a:solidFill>
-                        <a:effectLst/>
-                        <a:latin typeface="Calibri" panose="020F0502020204030204" pitchFamily="34" charset="0"/>
-                      </a:endParaRPr>
-                    </a:p>
-                  </a:txBody>
-                  <a:tcPr marL="1660" marR="1660" marT="1660" marB="0" anchor="ctr"/>
-                </a:tc>
-                <a:tc>
-                  <a:txBody>
-                    <a:bodyPr/>
-                    <a:lstStyle/>
-                    <a:p>
-                      <a:pPr algn="ctr" fontAlgn="ctr"/>
-                      <a:r>
-                        <a:rPr lang="es-CO" sz="500" u="none" strike="noStrike">
-                          <a:effectLst/>
-                        </a:rPr>
-                        <a:t>Tenencia y Cantidad de Vehiculos por Parte del Cliente </a:t>
-                      </a:r>
-                      <a:endParaRPr lang="es-CO" sz="500" b="0" i="0" u="none" strike="noStrike">
-                        <a:solidFill>
-                          <a:srgbClr val="000000"/>
-                        </a:solidFill>
-                        <a:effectLst/>
-                        <a:latin typeface="Calibri" panose="020F0502020204030204" pitchFamily="34" charset="0"/>
-                      </a:endParaRPr>
-                    </a:p>
-                  </a:txBody>
-                  <a:tcPr marL="1660" marR="1660" marT="1660" marB="0" anchor="ctr"/>
-                </a:tc>
-                <a:extLst>
-                  <a:ext uri="{0D108BD9-81ED-4DB2-BD59-A6C34878D82A}">
-                    <a16:rowId xmlns:a16="http://schemas.microsoft.com/office/drawing/2014/main" val="1443503553"/>
-                  </a:ext>
-                </a:extLst>
-              </a:tr>
-              <a:tr h="159377">
-                <a:tc>
-                  <a:txBody>
-                    <a:bodyPr/>
-                    <a:lstStyle/>
-                    <a:p>
-                      <a:pPr algn="ctr" fontAlgn="b"/>
-                      <a:r>
-                        <a:rPr lang="es-CO" sz="500" u="none" strike="noStrike">
-                          <a:effectLst/>
-                        </a:rPr>
-                        <a:t>Destinacion_Vivienda</a:t>
-                      </a:r>
-                      <a:endParaRPr lang="es-CO" sz="500" b="0" i="0" u="none" strike="noStrike">
-                        <a:solidFill>
-                          <a:srgbClr val="000000"/>
-                        </a:solidFill>
-                        <a:effectLst/>
-                        <a:latin typeface="Calibri" panose="020F0502020204030204" pitchFamily="34" charset="0"/>
-                      </a:endParaRPr>
-                    </a:p>
-                  </a:txBody>
-                  <a:tcPr marL="1660" marR="1660" marT="1660" marB="0" anchor="b"/>
-                </a:tc>
-                <a:tc>
-                  <a:txBody>
-                    <a:bodyPr/>
-                    <a:lstStyle/>
-                    <a:p>
-                      <a:pPr algn="ctr" fontAlgn="ctr"/>
-                      <a:r>
-                        <a:rPr lang="es-CO" sz="500" u="none" strike="noStrike">
-                          <a:effectLst/>
-                        </a:rPr>
-                        <a:t>Binario</a:t>
-                      </a:r>
-                      <a:endParaRPr lang="es-CO" sz="500" b="0" i="0" u="none" strike="noStrike">
-                        <a:solidFill>
-                          <a:srgbClr val="000000"/>
-                        </a:solidFill>
-                        <a:effectLst/>
-                        <a:latin typeface="Calibri" panose="020F0502020204030204" pitchFamily="34" charset="0"/>
-                      </a:endParaRPr>
-                    </a:p>
-                  </a:txBody>
-                  <a:tcPr marL="1660" marR="1660" marT="1660" marB="0" anchor="ctr"/>
-                </a:tc>
-                <a:tc>
-                  <a:txBody>
-                    <a:bodyPr/>
-                    <a:lstStyle/>
-                    <a:p>
-                      <a:pPr algn="ctr" fontAlgn="ctr"/>
-                      <a:r>
-                        <a:rPr lang="es-CO" sz="500" u="none" strike="noStrike">
-                          <a:effectLst/>
-                        </a:rPr>
-                        <a:t>Seleccion Multiple (Residencia familiar, Inversionista). No puede quedar vacio.</a:t>
-                      </a:r>
-                      <a:endParaRPr lang="es-CO" sz="500" b="0" i="0" u="none" strike="noStrike">
-                        <a:solidFill>
-                          <a:srgbClr val="000000"/>
-                        </a:solidFill>
-                        <a:effectLst/>
-                        <a:latin typeface="Calibri" panose="020F0502020204030204" pitchFamily="34" charset="0"/>
-                      </a:endParaRPr>
-                    </a:p>
-                  </a:txBody>
-                  <a:tcPr marL="1660" marR="1660" marT="1660" marB="0" anchor="ctr"/>
-                </a:tc>
-                <a:tc>
-                  <a:txBody>
-                    <a:bodyPr/>
-                    <a:lstStyle/>
-                    <a:p>
-                      <a:pPr algn="r" fontAlgn="b"/>
-                      <a:r>
-                        <a:rPr lang="es-CO" sz="500" u="none" strike="noStrike">
-                          <a:effectLst/>
-                        </a:rPr>
-                        <a:t>0,1</a:t>
-                      </a:r>
-                      <a:endParaRPr lang="es-CO" sz="500" b="0" i="0" u="none" strike="noStrike">
-                        <a:solidFill>
-                          <a:srgbClr val="000000"/>
-                        </a:solidFill>
-                        <a:effectLst/>
-                        <a:latin typeface="Calibri" panose="020F0502020204030204" pitchFamily="34" charset="0"/>
-                      </a:endParaRPr>
-                    </a:p>
-                  </a:txBody>
-                  <a:tcPr marL="1660" marR="1660" marT="1660" marB="0" anchor="b"/>
-                </a:tc>
-                <a:tc>
-                  <a:txBody>
-                    <a:bodyPr/>
-                    <a:lstStyle/>
-                    <a:p>
-                      <a:pPr algn="l" fontAlgn="b"/>
-                      <a:r>
-                        <a:rPr lang="es-CO" sz="500" u="none" strike="noStrike">
-                          <a:effectLst/>
-                        </a:rPr>
-                        <a:t>Destinacion del inmueble por parte del cliente</a:t>
-                      </a:r>
-                      <a:endParaRPr lang="es-CO" sz="500" b="0" i="0" u="none" strike="noStrike">
-                        <a:solidFill>
-                          <a:srgbClr val="000000"/>
-                        </a:solidFill>
-                        <a:effectLst/>
-                        <a:latin typeface="Calibri" panose="020F0502020204030204" pitchFamily="34" charset="0"/>
-                      </a:endParaRPr>
-                    </a:p>
-                  </a:txBody>
-                  <a:tcPr marL="1660" marR="1660" marT="1660" marB="0" anchor="b"/>
-                </a:tc>
-                <a:extLst>
-                  <a:ext uri="{0D108BD9-81ED-4DB2-BD59-A6C34878D82A}">
-                    <a16:rowId xmlns:a16="http://schemas.microsoft.com/office/drawing/2014/main" val="1719437937"/>
-                  </a:ext>
-                </a:extLst>
-              </a:tr>
-              <a:tr h="398444">
-                <a:tc>
-                  <a:txBody>
-                    <a:bodyPr/>
-                    <a:lstStyle/>
-                    <a:p>
-                      <a:pPr algn="ctr" fontAlgn="b"/>
-                      <a:r>
-                        <a:rPr lang="es-CO" sz="500" u="none" strike="noStrike">
-                          <a:effectLst/>
-                        </a:rPr>
-                        <a:t>Ingresos_Hogar_Mes</a:t>
-                      </a:r>
-                      <a:endParaRPr lang="es-CO" sz="500" b="0" i="0" u="none" strike="noStrike">
-                        <a:solidFill>
-                          <a:srgbClr val="000000"/>
-                        </a:solidFill>
-                        <a:effectLst/>
-                        <a:latin typeface="Calibri" panose="020F0502020204030204" pitchFamily="34" charset="0"/>
-                      </a:endParaRPr>
-                    </a:p>
-                  </a:txBody>
-                  <a:tcPr marL="1660" marR="1660" marT="1660" marB="0" anchor="b"/>
-                </a:tc>
-                <a:tc>
-                  <a:txBody>
-                    <a:bodyPr/>
-                    <a:lstStyle/>
-                    <a:p>
-                      <a:pPr algn="ctr" fontAlgn="ctr"/>
-                      <a:r>
-                        <a:rPr lang="es-CO" sz="500" u="none" strike="noStrike">
-                          <a:effectLst/>
-                        </a:rPr>
-                        <a:t>Float</a:t>
-                      </a:r>
-                      <a:endParaRPr lang="es-CO" sz="500" b="0" i="0" u="none" strike="noStrike">
-                        <a:solidFill>
-                          <a:srgbClr val="000000"/>
-                        </a:solidFill>
-                        <a:effectLst/>
-                        <a:latin typeface="Calibri" panose="020F0502020204030204" pitchFamily="34" charset="0"/>
-                      </a:endParaRPr>
-                    </a:p>
-                  </a:txBody>
-                  <a:tcPr marL="1660" marR="1660" marT="1660" marB="0" anchor="ctr"/>
-                </a:tc>
-                <a:tc>
-                  <a:txBody>
-                    <a:bodyPr/>
-                    <a:lstStyle/>
-                    <a:p>
-                      <a:pPr algn="ctr" fontAlgn="ctr"/>
-                      <a:r>
-                        <a:rPr lang="es-CO" sz="500" u="none" strike="noStrike">
-                          <a:effectLst/>
-                        </a:rPr>
-                        <a:t>Real Parametrizable (Entre 0 y 50). Validar Campo (No numeros negativos, ni cero, ni mas de 50). No puede quedar vacio.</a:t>
-                      </a:r>
-                      <a:endParaRPr lang="es-CO" sz="500" b="0" i="0" u="none" strike="noStrike">
-                        <a:solidFill>
-                          <a:srgbClr val="000000"/>
-                        </a:solidFill>
-                        <a:effectLst/>
-                        <a:latin typeface="Calibri" panose="020F0502020204030204" pitchFamily="34" charset="0"/>
-                      </a:endParaRPr>
-                    </a:p>
-                  </a:txBody>
-                  <a:tcPr marL="1660" marR="1660" marT="1660" marB="0" anchor="ctr"/>
-                </a:tc>
-                <a:tc>
-                  <a:txBody>
-                    <a:bodyPr/>
-                    <a:lstStyle/>
-                    <a:p>
-                      <a:pPr algn="ctr" fontAlgn="ctr"/>
-                      <a:r>
-                        <a:rPr lang="es-CO" sz="500" u="none" strike="noStrike">
-                          <a:effectLst/>
-                        </a:rPr>
-                        <a:t>Ingresos_Hogar_Mes*1000000</a:t>
-                      </a:r>
-                      <a:endParaRPr lang="es-CO" sz="500" b="0" i="0" u="none" strike="noStrike">
-                        <a:solidFill>
-                          <a:srgbClr val="000000"/>
-                        </a:solidFill>
-                        <a:effectLst/>
-                        <a:latin typeface="Calibri" panose="020F0502020204030204" pitchFamily="34" charset="0"/>
-                      </a:endParaRPr>
-                    </a:p>
-                  </a:txBody>
-                  <a:tcPr marL="1660" marR="1660" marT="1660" marB="0" anchor="ctr"/>
-                </a:tc>
-                <a:tc>
-                  <a:txBody>
-                    <a:bodyPr/>
-                    <a:lstStyle/>
-                    <a:p>
-                      <a:pPr algn="ctr" fontAlgn="b"/>
-                      <a:r>
-                        <a:rPr lang="es-CO" sz="500" u="none" strike="noStrike">
-                          <a:effectLst/>
-                        </a:rPr>
-                        <a:t>Determinacion del Ingreso del Hogar. El Formulario, debe pedir el numero en millones. Si gana menos de un millon indicar al cliente que ponga 1.</a:t>
-                      </a:r>
-                      <a:endParaRPr lang="es-CO" sz="500" b="0" i="0" u="none" strike="noStrike">
-                        <a:solidFill>
-                          <a:srgbClr val="000000"/>
-                        </a:solidFill>
-                        <a:effectLst/>
-                        <a:latin typeface="Calibri" panose="020F0502020204030204" pitchFamily="34" charset="0"/>
-                      </a:endParaRPr>
-                    </a:p>
-                  </a:txBody>
-                  <a:tcPr marL="1660" marR="1660" marT="1660" marB="0" anchor="b"/>
-                </a:tc>
-                <a:extLst>
-                  <a:ext uri="{0D108BD9-81ED-4DB2-BD59-A6C34878D82A}">
-                    <a16:rowId xmlns:a16="http://schemas.microsoft.com/office/drawing/2014/main" val="2690379175"/>
-                  </a:ext>
-                </a:extLst>
-              </a:tr>
-              <a:tr h="239066">
-                <a:tc>
-                  <a:txBody>
-                    <a:bodyPr/>
-                    <a:lstStyle/>
-                    <a:p>
-                      <a:pPr algn="ctr" fontAlgn="b"/>
-                      <a:r>
-                        <a:rPr lang="es-CO" sz="500" u="none" strike="noStrike">
-                          <a:effectLst/>
-                        </a:rPr>
-                        <a:t>Capacidad_Pago_Mes</a:t>
-                      </a:r>
-                      <a:endParaRPr lang="es-CO" sz="500" b="0" i="0" u="none" strike="noStrike">
-                        <a:solidFill>
-                          <a:srgbClr val="000000"/>
-                        </a:solidFill>
-                        <a:effectLst/>
-                        <a:latin typeface="Calibri" panose="020F0502020204030204" pitchFamily="34" charset="0"/>
-                      </a:endParaRPr>
-                    </a:p>
-                  </a:txBody>
-                  <a:tcPr marL="1660" marR="1660" marT="1660" marB="0" anchor="b"/>
-                </a:tc>
-                <a:tc>
-                  <a:txBody>
-                    <a:bodyPr/>
-                    <a:lstStyle/>
-                    <a:p>
-                      <a:pPr algn="ctr" fontAlgn="ctr"/>
-                      <a:r>
-                        <a:rPr lang="es-CO" sz="500" u="none" strike="noStrike">
-                          <a:effectLst/>
-                        </a:rPr>
-                        <a:t>Float</a:t>
-                      </a:r>
-                      <a:endParaRPr lang="es-CO" sz="500" b="0" i="0" u="none" strike="noStrike">
-                        <a:solidFill>
-                          <a:srgbClr val="000000"/>
-                        </a:solidFill>
-                        <a:effectLst/>
-                        <a:latin typeface="Calibri" panose="020F0502020204030204" pitchFamily="34" charset="0"/>
-                      </a:endParaRPr>
-                    </a:p>
-                  </a:txBody>
-                  <a:tcPr marL="1660" marR="1660" marT="1660" marB="0" anchor="ctr"/>
-                </a:tc>
-                <a:tc>
-                  <a:txBody>
-                    <a:bodyPr/>
-                    <a:lstStyle/>
-                    <a:p>
-                      <a:pPr algn="ctr" fontAlgn="ctr"/>
-                      <a:r>
-                        <a:rPr lang="es-CO" sz="500" u="none" strike="noStrike">
-                          <a:effectLst/>
-                        </a:rPr>
-                        <a:t>N.A.</a:t>
-                      </a:r>
-                      <a:endParaRPr lang="es-CO" sz="500" b="0" i="0" u="none" strike="noStrike">
-                        <a:solidFill>
-                          <a:srgbClr val="000000"/>
-                        </a:solidFill>
-                        <a:effectLst/>
-                        <a:latin typeface="Calibri" panose="020F0502020204030204" pitchFamily="34" charset="0"/>
-                      </a:endParaRPr>
-                    </a:p>
-                  </a:txBody>
-                  <a:tcPr marL="1660" marR="1660" marT="1660" marB="0" anchor="ctr"/>
-                </a:tc>
-                <a:tc>
-                  <a:txBody>
-                    <a:bodyPr/>
-                    <a:lstStyle/>
-                    <a:p>
-                      <a:pPr algn="ctr" fontAlgn="ctr"/>
-                      <a:r>
-                        <a:rPr lang="es-CO" sz="500" u="none" strike="noStrike">
-                          <a:effectLst/>
-                        </a:rPr>
-                        <a:t>Ingresos_Hogar_Mes*30%</a:t>
-                      </a:r>
-                      <a:endParaRPr lang="es-CO" sz="500" b="0" i="0" u="none" strike="noStrike">
-                        <a:solidFill>
-                          <a:srgbClr val="000000"/>
-                        </a:solidFill>
-                        <a:effectLst/>
-                        <a:latin typeface="Calibri" panose="020F0502020204030204" pitchFamily="34" charset="0"/>
-                      </a:endParaRPr>
-                    </a:p>
-                  </a:txBody>
-                  <a:tcPr marL="1660" marR="1660" marT="1660" marB="0" anchor="ctr"/>
-                </a:tc>
-                <a:tc>
-                  <a:txBody>
-                    <a:bodyPr/>
-                    <a:lstStyle/>
-                    <a:p>
-                      <a:pPr algn="ctr" fontAlgn="b"/>
-                      <a:r>
-                        <a:rPr lang="es-CO" sz="500" u="none" strike="noStrike">
-                          <a:effectLst/>
-                        </a:rPr>
-                        <a:t>Determinacion de la capacidad de pago Mensual del Hogar del Cliente</a:t>
-                      </a:r>
-                      <a:endParaRPr lang="es-CO" sz="500" b="0" i="0" u="none" strike="noStrike">
-                        <a:solidFill>
-                          <a:srgbClr val="000000"/>
-                        </a:solidFill>
-                        <a:effectLst/>
-                        <a:latin typeface="Calibri" panose="020F0502020204030204" pitchFamily="34" charset="0"/>
-                      </a:endParaRPr>
-                    </a:p>
-                  </a:txBody>
-                  <a:tcPr marL="1660" marR="1660" marT="1660" marB="0" anchor="b"/>
-                </a:tc>
-                <a:extLst>
-                  <a:ext uri="{0D108BD9-81ED-4DB2-BD59-A6C34878D82A}">
-                    <a16:rowId xmlns:a16="http://schemas.microsoft.com/office/drawing/2014/main" val="174633553"/>
-                  </a:ext>
-                </a:extLst>
-              </a:tr>
-              <a:tr h="398444">
-                <a:tc>
-                  <a:txBody>
-                    <a:bodyPr/>
-                    <a:lstStyle/>
-                    <a:p>
-                      <a:pPr algn="ctr" fontAlgn="b"/>
-                      <a:r>
-                        <a:rPr lang="es-CO" sz="500" u="none" strike="noStrike">
-                          <a:effectLst/>
-                        </a:rPr>
-                        <a:t>Ahorros_Cuota_Inicial</a:t>
-                      </a:r>
-                      <a:endParaRPr lang="es-CO" sz="500" b="0" i="0" u="none" strike="noStrike">
-                        <a:solidFill>
-                          <a:srgbClr val="000000"/>
-                        </a:solidFill>
-                        <a:effectLst/>
-                        <a:latin typeface="Calibri" panose="020F0502020204030204" pitchFamily="34" charset="0"/>
-                      </a:endParaRPr>
-                    </a:p>
-                  </a:txBody>
-                  <a:tcPr marL="1660" marR="1660" marT="1660" marB="0" anchor="b"/>
-                </a:tc>
-                <a:tc>
-                  <a:txBody>
-                    <a:bodyPr/>
-                    <a:lstStyle/>
-                    <a:p>
-                      <a:pPr algn="ctr" fontAlgn="ctr"/>
-                      <a:r>
-                        <a:rPr lang="es-CO" sz="500" u="none" strike="noStrike">
-                          <a:effectLst/>
-                        </a:rPr>
-                        <a:t>Float</a:t>
-                      </a:r>
-                      <a:endParaRPr lang="es-CO" sz="500" b="0" i="0" u="none" strike="noStrike">
-                        <a:solidFill>
-                          <a:srgbClr val="000000"/>
-                        </a:solidFill>
-                        <a:effectLst/>
-                        <a:latin typeface="Calibri" panose="020F0502020204030204" pitchFamily="34" charset="0"/>
-                      </a:endParaRPr>
-                    </a:p>
-                  </a:txBody>
-                  <a:tcPr marL="1660" marR="1660" marT="1660" marB="0" anchor="ctr"/>
-                </a:tc>
-                <a:tc>
-                  <a:txBody>
-                    <a:bodyPr/>
-                    <a:lstStyle/>
-                    <a:p>
-                      <a:pPr algn="ctr" fontAlgn="ctr"/>
-                      <a:r>
-                        <a:rPr lang="es-CO" sz="500" u="none" strike="noStrike">
-                          <a:effectLst/>
-                        </a:rPr>
-                        <a:t>Entero Parametrizable (Entre 0 y 1000). Validar Campo (No numeros negativos, ni mas de 1000). No puede quedar vacio.</a:t>
-                      </a:r>
-                      <a:endParaRPr lang="es-CO" sz="500" b="0" i="0" u="none" strike="noStrike">
-                        <a:solidFill>
-                          <a:srgbClr val="000000"/>
-                        </a:solidFill>
-                        <a:effectLst/>
-                        <a:latin typeface="Calibri" panose="020F0502020204030204" pitchFamily="34" charset="0"/>
-                      </a:endParaRPr>
-                    </a:p>
-                  </a:txBody>
-                  <a:tcPr marL="1660" marR="1660" marT="1660" marB="0" anchor="ctr"/>
-                </a:tc>
-                <a:tc>
-                  <a:txBody>
-                    <a:bodyPr/>
-                    <a:lstStyle/>
-                    <a:p>
-                      <a:pPr algn="ctr" fontAlgn="ctr"/>
-                      <a:r>
-                        <a:rPr lang="es-CO" sz="500" u="none" strike="noStrike">
-                          <a:effectLst/>
-                        </a:rPr>
-                        <a:t>Ahorros_Cuota Inicial</a:t>
-                      </a:r>
-                      <a:endParaRPr lang="es-CO" sz="500" b="0" i="0" u="none" strike="noStrike">
-                        <a:solidFill>
-                          <a:srgbClr val="000000"/>
-                        </a:solidFill>
-                        <a:effectLst/>
-                        <a:latin typeface="Calibri" panose="020F0502020204030204" pitchFamily="34" charset="0"/>
-                      </a:endParaRPr>
-                    </a:p>
-                  </a:txBody>
-                  <a:tcPr marL="1660" marR="1660" marT="1660" marB="0" anchor="ctr"/>
-                </a:tc>
-                <a:tc>
-                  <a:txBody>
-                    <a:bodyPr/>
-                    <a:lstStyle/>
-                    <a:p>
-                      <a:pPr algn="ctr" fontAlgn="ctr"/>
-                      <a:r>
-                        <a:rPr lang="es-CO" sz="500" u="none" strike="noStrike">
-                          <a:effectLst/>
-                        </a:rPr>
-                        <a:t>Determinacion del valor del ahorro del cliente para el pago de la cuota inicial. El Formulario, debe pedir el numero en millones.</a:t>
-                      </a:r>
-                      <a:endParaRPr lang="es-CO" sz="500" b="0" i="0" u="none" strike="noStrike">
-                        <a:solidFill>
-                          <a:srgbClr val="000000"/>
-                        </a:solidFill>
-                        <a:effectLst/>
-                        <a:latin typeface="Calibri" panose="020F0502020204030204" pitchFamily="34" charset="0"/>
-                      </a:endParaRPr>
-                    </a:p>
-                  </a:txBody>
-                  <a:tcPr marL="1660" marR="1660" marT="1660" marB="0" anchor="ctr"/>
-                </a:tc>
-                <a:extLst>
-                  <a:ext uri="{0D108BD9-81ED-4DB2-BD59-A6C34878D82A}">
-                    <a16:rowId xmlns:a16="http://schemas.microsoft.com/office/drawing/2014/main" val="228738570"/>
-                  </a:ext>
-                </a:extLst>
-              </a:tr>
-              <a:tr h="320415">
-                <a:tc>
-                  <a:txBody>
-                    <a:bodyPr/>
-                    <a:lstStyle/>
-                    <a:p>
-                      <a:pPr algn="ctr" fontAlgn="b"/>
-                      <a:r>
-                        <a:rPr lang="es-CO" sz="500" u="none" strike="noStrike">
-                          <a:effectLst/>
-                        </a:rPr>
-                        <a:t>Tiempo_Entrega</a:t>
-                      </a:r>
-                      <a:endParaRPr lang="es-CO" sz="500" b="0" i="0" u="none" strike="noStrike">
-                        <a:solidFill>
-                          <a:srgbClr val="000000"/>
-                        </a:solidFill>
-                        <a:effectLst/>
-                        <a:latin typeface="Calibri" panose="020F0502020204030204" pitchFamily="34" charset="0"/>
-                      </a:endParaRPr>
-                    </a:p>
-                  </a:txBody>
-                  <a:tcPr marL="1660" marR="1660" marT="1660" marB="0" anchor="b"/>
-                </a:tc>
-                <a:tc>
-                  <a:txBody>
-                    <a:bodyPr/>
-                    <a:lstStyle/>
-                    <a:p>
-                      <a:pPr algn="ctr" fontAlgn="ctr"/>
-                      <a:r>
-                        <a:rPr lang="es-CO" sz="500" u="none" strike="noStrike" dirty="0" err="1">
-                          <a:effectLst/>
-                        </a:rPr>
-                        <a:t>Int</a:t>
-                      </a:r>
-                      <a:endParaRPr lang="es-CO" sz="500" b="0" i="0" u="none" strike="noStrike" dirty="0">
-                        <a:solidFill>
-                          <a:srgbClr val="000000"/>
-                        </a:solidFill>
-                        <a:effectLst/>
-                        <a:latin typeface="Calibri" panose="020F0502020204030204" pitchFamily="34" charset="0"/>
-                      </a:endParaRPr>
-                    </a:p>
-                  </a:txBody>
-                  <a:tcPr marL="1660" marR="1660" marT="1660" marB="0" anchor="ctr"/>
-                </a:tc>
-                <a:tc>
-                  <a:txBody>
-                    <a:bodyPr/>
-                    <a:lstStyle/>
-                    <a:p>
-                      <a:pPr algn="ctr" fontAlgn="ctr"/>
-                      <a:r>
-                        <a:rPr lang="es-CO" sz="500" u="none" strike="noStrike" dirty="0" err="1">
-                          <a:effectLst/>
-                        </a:rPr>
-                        <a:t>Seleccion</a:t>
-                      </a:r>
-                      <a:r>
-                        <a:rPr lang="es-CO" sz="500" u="none" strike="noStrike" dirty="0">
-                          <a:effectLst/>
-                        </a:rPr>
-                        <a:t> </a:t>
-                      </a:r>
-                      <a:r>
-                        <a:rPr lang="es-CO" sz="500" u="none" strike="noStrike" dirty="0" err="1">
-                          <a:effectLst/>
-                        </a:rPr>
-                        <a:t>Multiple</a:t>
-                      </a:r>
-                      <a:r>
-                        <a:rPr lang="es-CO" sz="500" u="none" strike="noStrike" dirty="0">
-                          <a:effectLst/>
-                        </a:rPr>
-                        <a:t> (Inmediato, Dentro de 6 meses o Menos, Dentro de un ano, Dentro de 2 anos o mas). No puede quedar </a:t>
-                      </a:r>
-                      <a:r>
-                        <a:rPr lang="es-CO" sz="500" u="none" strike="noStrike" dirty="0" err="1">
-                          <a:effectLst/>
-                        </a:rPr>
-                        <a:t>vacio</a:t>
-                      </a:r>
-                      <a:r>
-                        <a:rPr lang="es-CO" sz="500" u="none" strike="noStrike" dirty="0">
-                          <a:effectLst/>
-                        </a:rPr>
-                        <a:t>.</a:t>
-                      </a:r>
-                      <a:endParaRPr lang="es-CO" sz="500" b="0" i="0" u="none" strike="noStrike" dirty="0">
-                        <a:solidFill>
-                          <a:srgbClr val="000000"/>
-                        </a:solidFill>
-                        <a:effectLst/>
-                        <a:latin typeface="Calibri" panose="020F0502020204030204" pitchFamily="34" charset="0"/>
-                      </a:endParaRPr>
-                    </a:p>
-                  </a:txBody>
-                  <a:tcPr marL="1660" marR="1660" marT="1660" marB="0" anchor="ctr"/>
-                </a:tc>
-                <a:tc>
-                  <a:txBody>
-                    <a:bodyPr/>
-                    <a:lstStyle/>
-                    <a:p>
-                      <a:pPr algn="ctr" fontAlgn="ctr"/>
-                      <a:r>
-                        <a:rPr lang="es-CO" sz="500" u="none" strike="noStrike">
-                          <a:effectLst/>
-                        </a:rPr>
-                        <a:t>0,6,12,24</a:t>
-                      </a:r>
-                      <a:endParaRPr lang="es-CO" sz="500" b="0" i="0" u="none" strike="noStrike">
-                        <a:solidFill>
-                          <a:srgbClr val="000000"/>
-                        </a:solidFill>
-                        <a:effectLst/>
-                        <a:latin typeface="Calibri" panose="020F0502020204030204" pitchFamily="34" charset="0"/>
-                      </a:endParaRPr>
-                    </a:p>
-                  </a:txBody>
-                  <a:tcPr marL="1660" marR="1660" marT="1660" marB="0" anchor="ctr"/>
-                </a:tc>
-                <a:tc>
-                  <a:txBody>
-                    <a:bodyPr/>
-                    <a:lstStyle/>
-                    <a:p>
-                      <a:pPr algn="ctr" fontAlgn="ctr"/>
-                      <a:r>
-                        <a:rPr lang="es-CO" sz="500" u="none" strike="noStrike" dirty="0" err="1">
-                          <a:effectLst/>
-                        </a:rPr>
-                        <a:t>Determinacion</a:t>
-                      </a:r>
-                      <a:r>
-                        <a:rPr lang="es-CO" sz="500" u="none" strike="noStrike" dirty="0">
-                          <a:effectLst/>
-                        </a:rPr>
-                        <a:t> del Tiempo de Entrega del bien Inmueble para el cliente</a:t>
-                      </a:r>
-                      <a:endParaRPr lang="es-CO" sz="500" b="0" i="0" u="none" strike="noStrike" dirty="0">
-                        <a:solidFill>
-                          <a:srgbClr val="000000"/>
-                        </a:solidFill>
-                        <a:effectLst/>
-                        <a:latin typeface="Calibri" panose="020F0502020204030204" pitchFamily="34" charset="0"/>
-                      </a:endParaRPr>
-                    </a:p>
-                  </a:txBody>
-                  <a:tcPr marL="1660" marR="1660" marT="1660" marB="0" anchor="ctr"/>
-                </a:tc>
-                <a:extLst>
-                  <a:ext uri="{0D108BD9-81ED-4DB2-BD59-A6C34878D82A}">
-                    <a16:rowId xmlns:a16="http://schemas.microsoft.com/office/drawing/2014/main" val="2367833264"/>
-                  </a:ext>
-                </a:extLst>
-              </a:tr>
-            </a:tbl>
-          </a:graphicData>
-        </a:graphic>
-      </p:graphicFrame>
-      <p:sp>
-        <p:nvSpPr>
-          <p:cNvPr id="13" name="Rectángulo 12">
-            <a:extLst>
-              <a:ext uri="{FF2B5EF4-FFF2-40B4-BE49-F238E27FC236}">
-                <a16:creationId xmlns:a16="http://schemas.microsoft.com/office/drawing/2014/main" id="{DAEEF83C-BB9A-4BCF-B66E-4F41AF92476A}"/>
-              </a:ext>
-            </a:extLst>
-          </p:cNvPr>
-          <p:cNvSpPr/>
-          <p:nvPr/>
-        </p:nvSpPr>
-        <p:spPr>
-          <a:xfrm>
-            <a:off x="6262295" y="2380070"/>
-            <a:ext cx="1709229" cy="2259221"/>
-          </a:xfrm>
-          <a:prstGeom prst="rect">
-            <a:avLst/>
-          </a:prstGeom>
-        </p:spPr>
-        <p:style>
-          <a:lnRef idx="2">
-            <a:schemeClr val="accent1">
-              <a:shade val="50000"/>
-            </a:schemeClr>
-          </a:lnRef>
-          <a:fillRef idx="1">
-            <a:schemeClr val="accent1"/>
-          </a:fillRef>
-          <a:effectRef idx="0">
-            <a:schemeClr val="accent1"/>
-          </a:effectRef>
-          <a:fontRef idx="minor">
-            <a:schemeClr val="lt1"/>
-          </a:fontRef>
-        </p:style>
-        <p:txBody>
-          <a:bodyPr rtlCol="0" anchor="ctr"/>
-          <a:lstStyle/>
-          <a:p>
-            <a:pPr algn="ctr"/>
-            <a:r>
-              <a:rPr lang="en-US" dirty="0" err="1"/>
-              <a:t>Mostrar</a:t>
-            </a:r>
-            <a:r>
-              <a:rPr lang="en-US" dirty="0"/>
-              <a:t> </a:t>
-            </a:r>
-            <a:r>
-              <a:rPr lang="en-US" dirty="0" err="1"/>
-              <a:t>Aletoriamente</a:t>
-            </a:r>
-            <a:r>
-              <a:rPr lang="en-US" dirty="0"/>
-              <a:t> 3 </a:t>
-            </a:r>
-            <a:r>
-              <a:rPr lang="en-US" dirty="0" err="1"/>
-              <a:t>apartamentos</a:t>
-            </a:r>
-            <a:r>
-              <a:rPr lang="en-US" dirty="0"/>
-              <a:t> y </a:t>
-            </a:r>
-            <a:r>
-              <a:rPr lang="en-US" dirty="0" err="1"/>
-              <a:t>permitir</a:t>
-            </a:r>
-            <a:r>
-              <a:rPr lang="en-US" dirty="0"/>
-              <a:t> que el </a:t>
-            </a:r>
-            <a:r>
-              <a:rPr lang="en-US" dirty="0" err="1"/>
-              <a:t>usuario</a:t>
-            </a:r>
-            <a:r>
-              <a:rPr lang="en-US" dirty="0"/>
-              <a:t> </a:t>
-            </a:r>
-            <a:r>
-              <a:rPr lang="en-US" dirty="0" err="1"/>
-              <a:t>califique</a:t>
-            </a:r>
-            <a:endParaRPr lang="es-CO" dirty="0"/>
-          </a:p>
-          <a:p>
-            <a:pPr marL="342900" indent="-342900" algn="ctr">
-              <a:buAutoNum type="arabicPeriod"/>
-            </a:pPr>
-            <a:endParaRPr lang="es-CO" dirty="0"/>
-          </a:p>
-        </p:txBody>
-      </p:sp>
-      <p:cxnSp>
-        <p:nvCxnSpPr>
-          <p:cNvPr id="23" name="Conector recto de flecha 22">
-            <a:extLst>
-              <a:ext uri="{FF2B5EF4-FFF2-40B4-BE49-F238E27FC236}">
-                <a16:creationId xmlns:a16="http://schemas.microsoft.com/office/drawing/2014/main" id="{092DB11D-F737-48E6-B4B8-8E1117915687}"/>
-              </a:ext>
-            </a:extLst>
-          </p:cNvPr>
-          <p:cNvCxnSpPr>
-            <a:cxnSpLocks/>
-            <a:stCxn id="11" idx="3"/>
-            <a:endCxn id="13" idx="1"/>
-          </p:cNvCxnSpPr>
-          <p:nvPr/>
-        </p:nvCxnSpPr>
-        <p:spPr>
-          <a:xfrm>
-            <a:off x="5929707" y="3509681"/>
-            <a:ext cx="332588" cy="0"/>
-          </a:xfrm>
-          <a:prstGeom prst="straightConnector1">
-            <a:avLst/>
-          </a:prstGeom>
-          <a:ln>
-            <a:tailEnd type="triangle"/>
-          </a:ln>
-        </p:spPr>
-        <p:style>
-          <a:lnRef idx="1">
-            <a:schemeClr val="dk1"/>
-          </a:lnRef>
-          <a:fillRef idx="0">
-            <a:schemeClr val="dk1"/>
-          </a:fillRef>
-          <a:effectRef idx="0">
-            <a:schemeClr val="dk1"/>
-          </a:effectRef>
-          <a:fontRef idx="minor">
-            <a:schemeClr val="tx1"/>
-          </a:fontRef>
-        </p:style>
-      </p:cxnSp>
-      <p:sp>
-        <p:nvSpPr>
-          <p:cNvPr id="30" name="Rectángulo 29">
-            <a:extLst>
-              <a:ext uri="{FF2B5EF4-FFF2-40B4-BE49-F238E27FC236}">
-                <a16:creationId xmlns:a16="http://schemas.microsoft.com/office/drawing/2014/main" id="{E9A72BA6-AF57-42CD-8289-0E1ECC8CDAA2}"/>
-              </a:ext>
-            </a:extLst>
-          </p:cNvPr>
-          <p:cNvSpPr/>
-          <p:nvPr/>
-        </p:nvSpPr>
-        <p:spPr>
-          <a:xfrm>
-            <a:off x="1508570" y="1290229"/>
-            <a:ext cx="500418" cy="4559930"/>
-          </a:xfrm>
-          <a:prstGeom prst="rect">
-            <a:avLst/>
-          </a:prstGeom>
-        </p:spPr>
-        <p:style>
-          <a:lnRef idx="2">
-            <a:schemeClr val="accent1">
-              <a:shade val="50000"/>
-            </a:schemeClr>
-          </a:lnRef>
-          <a:fillRef idx="1">
-            <a:schemeClr val="accent1"/>
-          </a:fillRef>
-          <a:effectRef idx="0">
-            <a:schemeClr val="accent1"/>
-          </a:effectRef>
-          <a:fontRef idx="minor">
-            <a:schemeClr val="lt1"/>
-          </a:fontRef>
-        </p:style>
-        <p:txBody>
-          <a:bodyPr vert="vert270" rtlCol="0" anchor="ctr"/>
-          <a:lstStyle/>
-          <a:p>
-            <a:pPr algn="ctr"/>
-            <a:endParaRPr lang="en-US" dirty="0"/>
-          </a:p>
-          <a:p>
-            <a:pPr algn="ctr"/>
-            <a:r>
-              <a:rPr lang="en-US" dirty="0" err="1">
-                <a:effectLst>
-                  <a:outerShdw blurRad="50800" dist="38100" dir="8100000" algn="tr" rotWithShape="0">
-                    <a:prstClr val="black">
-                      <a:alpha val="40000"/>
-                    </a:prstClr>
-                  </a:outerShdw>
-                </a:effectLst>
-              </a:rPr>
-              <a:t>Formulario</a:t>
-            </a:r>
-            <a:endParaRPr lang="es-CO" dirty="0">
-              <a:effectLst>
-                <a:outerShdw blurRad="50800" dist="38100" dir="8100000" algn="tr" rotWithShape="0">
-                  <a:prstClr val="black">
-                    <a:alpha val="40000"/>
-                  </a:prstClr>
-                </a:outerShdw>
-              </a:effectLst>
-            </a:endParaRPr>
-          </a:p>
-          <a:p>
-            <a:pPr marL="342900" indent="-342900" algn="ctr">
-              <a:buAutoNum type="arabicPeriod"/>
-            </a:pPr>
-            <a:endParaRPr lang="es-CO" dirty="0"/>
-          </a:p>
-        </p:txBody>
-      </p:sp>
-      <p:sp>
-        <p:nvSpPr>
-          <p:cNvPr id="34" name="Rectángulo 33">
-            <a:extLst>
-              <a:ext uri="{FF2B5EF4-FFF2-40B4-BE49-F238E27FC236}">
-                <a16:creationId xmlns:a16="http://schemas.microsoft.com/office/drawing/2014/main" id="{1F99B6D5-4263-4A87-8970-A0F0DEC0AA4B}"/>
-              </a:ext>
-            </a:extLst>
-          </p:cNvPr>
-          <p:cNvSpPr/>
-          <p:nvPr/>
-        </p:nvSpPr>
-        <p:spPr>
-          <a:xfrm>
-            <a:off x="3088131" y="5888078"/>
-            <a:ext cx="1595718" cy="582699"/>
-          </a:xfrm>
-          <a:prstGeom prst="rect">
-            <a:avLst/>
-          </a:prstGeom>
-          <a:solidFill>
-            <a:schemeClr val="accent4">
-              <a:lumMod val="60000"/>
-              <a:lumOff val="40000"/>
-            </a:schemeClr>
-          </a:solidFill>
-        </p:spPr>
-        <p:style>
-          <a:lnRef idx="2">
-            <a:schemeClr val="accent1">
-              <a:shade val="50000"/>
-            </a:schemeClr>
-          </a:lnRef>
-          <a:fillRef idx="1">
-            <a:schemeClr val="accent1"/>
-          </a:fillRef>
-          <a:effectRef idx="0">
-            <a:schemeClr val="accent1"/>
-          </a:effectRef>
-          <a:fontRef idx="minor">
-            <a:schemeClr val="lt1"/>
-          </a:fontRef>
-        </p:style>
-        <p:txBody>
-          <a:bodyPr rtlCol="0" anchor="ctr"/>
-          <a:lstStyle/>
-          <a:p>
-            <a:pPr algn="ctr"/>
-            <a:r>
-              <a:rPr lang="en-US" dirty="0"/>
-              <a:t>Web APP (</a:t>
-            </a:r>
-            <a:r>
-              <a:rPr lang="en-US" dirty="0" err="1"/>
-              <a:t>Formulario</a:t>
-            </a:r>
-            <a:r>
-              <a:rPr lang="en-US" dirty="0"/>
-              <a:t>)</a:t>
-            </a:r>
-            <a:endParaRPr lang="es-CO" dirty="0"/>
-          </a:p>
-        </p:txBody>
-      </p:sp>
-      <p:sp>
-        <p:nvSpPr>
-          <p:cNvPr id="35" name="Rectángulo 34">
-            <a:extLst>
-              <a:ext uri="{FF2B5EF4-FFF2-40B4-BE49-F238E27FC236}">
-                <a16:creationId xmlns:a16="http://schemas.microsoft.com/office/drawing/2014/main" id="{38FCFB5A-D60F-42FC-8477-25077FD8CA37}"/>
-              </a:ext>
-            </a:extLst>
-          </p:cNvPr>
-          <p:cNvSpPr/>
-          <p:nvPr/>
-        </p:nvSpPr>
-        <p:spPr>
-          <a:xfrm>
-            <a:off x="6262295" y="4960546"/>
-            <a:ext cx="1595719" cy="761989"/>
-          </a:xfrm>
-          <a:prstGeom prst="rect">
-            <a:avLst/>
-          </a:prstGeom>
-          <a:solidFill>
-            <a:schemeClr val="accent4">
-              <a:lumMod val="60000"/>
-              <a:lumOff val="40000"/>
-            </a:schemeClr>
-          </a:solidFill>
-        </p:spPr>
-        <p:style>
-          <a:lnRef idx="2">
-            <a:schemeClr val="accent1">
-              <a:shade val="50000"/>
-            </a:schemeClr>
-          </a:lnRef>
-          <a:fillRef idx="1">
-            <a:schemeClr val="accent1"/>
-          </a:fillRef>
-          <a:effectRef idx="0">
-            <a:schemeClr val="accent1"/>
-          </a:effectRef>
-          <a:fontRef idx="minor">
-            <a:schemeClr val="lt1"/>
-          </a:fontRef>
-        </p:style>
-        <p:txBody>
-          <a:bodyPr rtlCol="0" anchor="ctr"/>
-          <a:lstStyle/>
-          <a:p>
-            <a:pPr algn="ctr"/>
-            <a:r>
-              <a:rPr lang="en-US" dirty="0"/>
-              <a:t>Web APP (</a:t>
-            </a:r>
-            <a:r>
-              <a:rPr lang="en-US" dirty="0" err="1"/>
-              <a:t>Mostrar</a:t>
-            </a:r>
-            <a:r>
-              <a:rPr lang="en-US" dirty="0"/>
-              <a:t> </a:t>
-            </a:r>
-            <a:r>
-              <a:rPr lang="en-US" dirty="0" err="1"/>
-              <a:t>Apartamentos</a:t>
-            </a:r>
-            <a:r>
-              <a:rPr lang="en-US" dirty="0"/>
-              <a:t>)</a:t>
-            </a:r>
-            <a:endParaRPr lang="es-CO" dirty="0"/>
-          </a:p>
-        </p:txBody>
-      </p:sp>
-      <p:sp>
-        <p:nvSpPr>
-          <p:cNvPr id="37" name="Rectángulo 36">
-            <a:extLst>
-              <a:ext uri="{FF2B5EF4-FFF2-40B4-BE49-F238E27FC236}">
-                <a16:creationId xmlns:a16="http://schemas.microsoft.com/office/drawing/2014/main" id="{4D498A01-5DFB-4F22-994A-B8BE9203DC38}"/>
-              </a:ext>
-            </a:extLst>
-          </p:cNvPr>
-          <p:cNvSpPr/>
-          <p:nvPr/>
-        </p:nvSpPr>
-        <p:spPr>
-          <a:xfrm>
-            <a:off x="9032499" y="4982525"/>
-            <a:ext cx="1595719" cy="1133709"/>
-          </a:xfrm>
-          <a:prstGeom prst="rect">
-            <a:avLst/>
-          </a:prstGeom>
-          <a:solidFill>
-            <a:schemeClr val="accent4">
-              <a:lumMod val="60000"/>
-              <a:lumOff val="40000"/>
-            </a:schemeClr>
-          </a:solidFill>
-        </p:spPr>
-        <p:style>
-          <a:lnRef idx="2">
-            <a:schemeClr val="accent1">
-              <a:shade val="50000"/>
-            </a:schemeClr>
-          </a:lnRef>
-          <a:fillRef idx="1">
-            <a:schemeClr val="accent1"/>
-          </a:fillRef>
-          <a:effectRef idx="0">
-            <a:schemeClr val="accent1"/>
-          </a:effectRef>
-          <a:fontRef idx="minor">
-            <a:schemeClr val="lt1"/>
-          </a:fontRef>
-        </p:style>
-        <p:txBody>
-          <a:bodyPr rtlCol="0" anchor="ctr"/>
-          <a:lstStyle/>
-          <a:p>
-            <a:pPr algn="ctr"/>
-            <a:r>
-              <a:rPr lang="en-US" dirty="0"/>
-              <a:t>Web APP (</a:t>
-            </a:r>
-            <a:r>
-              <a:rPr lang="en-US" dirty="0" err="1"/>
-              <a:t>Ordenar</a:t>
-            </a:r>
-            <a:r>
-              <a:rPr lang="en-US" dirty="0"/>
-              <a:t> </a:t>
-            </a:r>
-            <a:r>
-              <a:rPr lang="en-US" dirty="0" err="1"/>
-              <a:t>apartamentos</a:t>
-            </a:r>
-            <a:r>
-              <a:rPr lang="en-US" dirty="0"/>
-              <a:t>)</a:t>
-            </a:r>
-            <a:endParaRPr lang="es-CO" dirty="0"/>
-          </a:p>
-        </p:txBody>
-      </p:sp>
-      <p:cxnSp>
-        <p:nvCxnSpPr>
-          <p:cNvPr id="18" name="Conector recto de flecha 17">
-            <a:extLst>
-              <a:ext uri="{FF2B5EF4-FFF2-40B4-BE49-F238E27FC236}">
-                <a16:creationId xmlns:a16="http://schemas.microsoft.com/office/drawing/2014/main" id="{F57C5A99-A36C-4507-B9DE-D2F52E71CFA3}"/>
-              </a:ext>
-            </a:extLst>
-          </p:cNvPr>
-          <p:cNvCxnSpPr>
-            <a:cxnSpLocks/>
-            <a:stCxn id="19" idx="2"/>
-          </p:cNvCxnSpPr>
-          <p:nvPr/>
-        </p:nvCxnSpPr>
-        <p:spPr>
-          <a:xfrm>
-            <a:off x="9776148" y="4419344"/>
-            <a:ext cx="0" cy="479868"/>
-          </a:xfrm>
-          <a:prstGeom prst="straightConnector1">
-            <a:avLst/>
-          </a:prstGeom>
-          <a:ln>
-            <a:tailEnd type="triangle"/>
-          </a:ln>
-        </p:spPr>
-        <p:style>
-          <a:lnRef idx="1">
-            <a:schemeClr val="dk1"/>
-          </a:lnRef>
-          <a:fillRef idx="0">
-            <a:schemeClr val="dk1"/>
-          </a:fillRef>
-          <a:effectRef idx="0">
-            <a:schemeClr val="dk1"/>
-          </a:effectRef>
-          <a:fontRef idx="minor">
-            <a:schemeClr val="tx1"/>
-          </a:fontRef>
-        </p:style>
-      </p:cxnSp>
-    </p:spTree>
-    <p:extLst>
-      <p:ext uri="{BB962C8B-B14F-4D97-AF65-F5344CB8AC3E}">
-        <p14:creationId xmlns:p14="http://schemas.microsoft.com/office/powerpoint/2010/main" val="3175870677"/>
-      </p:ext>
-    </p:extLst>
-  </p:cSld>
-  <p:clrMapOvr>
-    <a:masterClrMapping/>
-  </p:clrMapOvr>
-</p:sld>
-</file>
-
-<file path=ppt/slides/slide6.xml><?xml version="1.0" encoding="utf-8"?>
-<p:sld xmlns:a="http://schemas.openxmlformats.org/drawingml/2006/main" xmlns:r="http://schemas.openxmlformats.org/officeDocument/2006/relationships" xmlns:p="http://schemas.openxmlformats.org/presentationml/2006/main">
-  <p:cSld>
-    <p:spTree>
-      <p:nvGrpSpPr>
-        <p:cNvPr id="1" name=""/>
-        <p:cNvGrpSpPr/>
-        <p:nvPr/>
-      </p:nvGrpSpPr>
-      <p:grpSpPr>
-        <a:xfrm>
-          <a:off x="0" y="0"/>
-          <a:ext cx="0" cy="0"/>
-          <a:chOff x="0" y="0"/>
-          <a:chExt cx="0" cy="0"/>
-        </a:xfrm>
-      </p:grpSpPr>
-      <p:sp>
-        <p:nvSpPr>
-          <p:cNvPr id="4" name="CuadroTexto 3">
-            <a:extLst>
-              <a:ext uri="{FF2B5EF4-FFF2-40B4-BE49-F238E27FC236}">
-                <a16:creationId xmlns:a16="http://schemas.microsoft.com/office/drawing/2014/main" id="{6DFE3CFE-39D0-4F48-AA38-907E9F56CEBC}"/>
-              </a:ext>
-            </a:extLst>
-          </p:cNvPr>
-          <p:cNvSpPr txBox="1"/>
-          <p:nvPr/>
-        </p:nvSpPr>
-        <p:spPr>
-          <a:xfrm>
-            <a:off x="2752165" y="188259"/>
-            <a:ext cx="6687670" cy="707886"/>
-          </a:xfrm>
-          <a:prstGeom prst="rect">
-            <a:avLst/>
-          </a:prstGeom>
-          <a:noFill/>
-        </p:spPr>
-        <p:txBody>
-          <a:bodyPr wrap="square" rtlCol="0">
-            <a:spAutoFit/>
-          </a:bodyPr>
-          <a:lstStyle/>
-          <a:p>
-            <a:pPr algn="ctr"/>
-            <a:r>
-              <a:rPr lang="es-CO" sz="2000" dirty="0"/>
-              <a:t>DISEÑO DE ARQUITECTURA PARA IPR DEL SISTEMA DE RECOMENDACIÓN – INTERFAZ DE USUARIO</a:t>
-            </a:r>
-          </a:p>
-        </p:txBody>
-      </p:sp>
-      <p:sp>
-        <p:nvSpPr>
-          <p:cNvPr id="12" name="Rectángulo 11">
-            <a:extLst>
-              <a:ext uri="{FF2B5EF4-FFF2-40B4-BE49-F238E27FC236}">
-                <a16:creationId xmlns:a16="http://schemas.microsoft.com/office/drawing/2014/main" id="{9BE7C2CE-8468-4861-9C0D-D7B0AD270778}"/>
-              </a:ext>
-            </a:extLst>
-          </p:cNvPr>
-          <p:cNvSpPr/>
-          <p:nvPr/>
-        </p:nvSpPr>
-        <p:spPr>
-          <a:xfrm>
             <a:off x="2752165" y="3339355"/>
             <a:ext cx="1267719" cy="739587"/>
           </a:xfrm>
@@ -13091,6 +9619,22 @@
               <a:rPr lang="en-US" dirty="0" err="1"/>
               <a:t>Recomendacion</a:t>
             </a:r>
+            <a:r>
+              <a:rPr lang="en-US" dirty="0"/>
+              <a:t> (</a:t>
+            </a:r>
+            <a:r>
+              <a:rPr lang="en-US" dirty="0" err="1"/>
+              <a:t>nonpers_r</a:t>
+            </a:r>
+            <a:r>
+              <a:rPr lang="en-US" dirty="0"/>
+              <a:t>)</a:t>
+            </a:r>
+            <a:endParaRPr lang="es-CO" dirty="0"/>
+          </a:p>
+          <a:p>
+            <a:pPr algn="ctr"/>
             <a:endParaRPr lang="es-CO" dirty="0"/>
           </a:p>
           <a:p>
@@ -13472,7 +10016,7 @@
 </p:sld>
 </file>
 
-<file path=ppt/slides/slide7.xml><?xml version="1.0" encoding="utf-8"?>
+<file path=ppt/slides/slide6.xml><?xml version="1.0" encoding="utf-8"?>
 <p:sld xmlns:a="http://schemas.openxmlformats.org/drawingml/2006/main" xmlns:r="http://schemas.openxmlformats.org/officeDocument/2006/relationships" xmlns:p="http://schemas.openxmlformats.org/presentationml/2006/main">
   <p:cSld>
     <p:spTree>
@@ -18466,7 +15010,7 @@
 </p:sld>
 </file>
 
-<file path=ppt/slides/slide8.xml><?xml version="1.0" encoding="utf-8"?>
+<file path=ppt/slides/slide7.xml><?xml version="1.0" encoding="utf-8"?>
 <p:sld xmlns:a="http://schemas.openxmlformats.org/drawingml/2006/main" xmlns:r="http://schemas.openxmlformats.org/officeDocument/2006/relationships" xmlns:p="http://schemas.openxmlformats.org/presentationml/2006/main">
   <p:cSld>
     <p:spTree>
@@ -18773,7 +15317,7 @@
 </p:sld>
 </file>
 
-<file path=ppt/slides/slide9.xml><?xml version="1.0" encoding="utf-8"?>
+<file path=ppt/slides/slide8.xml><?xml version="1.0" encoding="utf-8"?>
 <p:sld xmlns:a="http://schemas.openxmlformats.org/drawingml/2006/main" xmlns:r="http://schemas.openxmlformats.org/officeDocument/2006/relationships" xmlns:p="http://schemas.openxmlformats.org/presentationml/2006/main">
   <p:cSld>
     <p:spTree>
@@ -19559,6 +16103,600 @@
     <p:extLst>
       <p:ext uri="{BB962C8B-B14F-4D97-AF65-F5344CB8AC3E}">
         <p14:creationId xmlns:p14="http://schemas.microsoft.com/office/powerpoint/2010/main" val="1975341629"/>
+      </p:ext>
+    </p:extLst>
+  </p:cSld>
+  <p:clrMapOvr>
+    <a:masterClrMapping/>
+  </p:clrMapOvr>
+</p:sld>
+</file>
+
+<file path=ppt/slides/slide9.xml><?xml version="1.0" encoding="utf-8"?>
+<p:sld xmlns:a="http://schemas.openxmlformats.org/drawingml/2006/main" xmlns:r="http://schemas.openxmlformats.org/officeDocument/2006/relationships" xmlns:p="http://schemas.openxmlformats.org/presentationml/2006/main">
+  <p:cSld>
+    <p:spTree>
+      <p:nvGrpSpPr>
+        <p:cNvPr id="1" name=""/>
+        <p:cNvGrpSpPr/>
+        <p:nvPr/>
+      </p:nvGrpSpPr>
+      <p:grpSpPr>
+        <a:xfrm>
+          <a:off x="0" y="0"/>
+          <a:ext cx="0" cy="0"/>
+          <a:chOff x="0" y="0"/>
+          <a:chExt cx="0" cy="0"/>
+        </a:xfrm>
+      </p:grpSpPr>
+      <p:sp>
+        <p:nvSpPr>
+          <p:cNvPr id="4" name="CuadroTexto 3">
+            <a:extLst>
+              <a:ext uri="{FF2B5EF4-FFF2-40B4-BE49-F238E27FC236}">
+                <a16:creationId xmlns:a16="http://schemas.microsoft.com/office/drawing/2014/main" id="{6DFE3CFE-39D0-4F48-AA38-907E9F56CEBC}"/>
+              </a:ext>
+            </a:extLst>
+          </p:cNvPr>
+          <p:cNvSpPr txBox="1"/>
+          <p:nvPr/>
+        </p:nvSpPr>
+        <p:spPr>
+          <a:xfrm>
+            <a:off x="2752165" y="188259"/>
+            <a:ext cx="6687670" cy="707886"/>
+          </a:xfrm>
+          <a:prstGeom prst="rect">
+            <a:avLst/>
+          </a:prstGeom>
+          <a:noFill/>
+        </p:spPr>
+        <p:txBody>
+          <a:bodyPr wrap="square" rtlCol="0">
+            <a:spAutoFit/>
+          </a:bodyPr>
+          <a:lstStyle/>
+          <a:p>
+            <a:pPr algn="ctr"/>
+            <a:r>
+              <a:rPr lang="es-CO" sz="2000" dirty="0"/>
+              <a:t>DISEÑO DE ARQUITECTURA PARA IPR DEL SISTEMA DE RECOMENDACIÓN – DISENO WEB APPS </a:t>
+            </a:r>
+          </a:p>
+        </p:txBody>
+      </p:sp>
+      <p:sp>
+        <p:nvSpPr>
+          <p:cNvPr id="19" name="Rectángulo 18">
+            <a:extLst>
+              <a:ext uri="{FF2B5EF4-FFF2-40B4-BE49-F238E27FC236}">
+                <a16:creationId xmlns:a16="http://schemas.microsoft.com/office/drawing/2014/main" id="{3FD5B202-D10A-46AA-A175-845E800F758F}"/>
+              </a:ext>
+            </a:extLst>
+          </p:cNvPr>
+          <p:cNvSpPr/>
+          <p:nvPr/>
+        </p:nvSpPr>
+        <p:spPr>
+          <a:xfrm>
+            <a:off x="436331" y="1162050"/>
+            <a:ext cx="1595718" cy="5188196"/>
+          </a:xfrm>
+          <a:prstGeom prst="rect">
+            <a:avLst/>
+          </a:prstGeom>
+          <a:solidFill>
+            <a:schemeClr val="accent4">
+              <a:lumMod val="60000"/>
+              <a:lumOff val="40000"/>
+            </a:schemeClr>
+          </a:solidFill>
+        </p:spPr>
+        <p:style>
+          <a:lnRef idx="2">
+            <a:schemeClr val="accent1">
+              <a:shade val="50000"/>
+            </a:schemeClr>
+          </a:lnRef>
+          <a:fillRef idx="1">
+            <a:schemeClr val="accent1"/>
+          </a:fillRef>
+          <a:effectRef idx="0">
+            <a:schemeClr val="accent1"/>
+          </a:effectRef>
+          <a:fontRef idx="minor">
+            <a:schemeClr val="lt1"/>
+          </a:fontRef>
+        </p:style>
+        <p:txBody>
+          <a:bodyPr rtlCol="0" anchor="ctr"/>
+          <a:lstStyle/>
+          <a:p>
+            <a:pPr algn="ctr"/>
+            <a:r>
+              <a:rPr lang="en-US" dirty="0"/>
+              <a:t>Web APP (</a:t>
+            </a:r>
+            <a:r>
+              <a:rPr lang="en-US" dirty="0" err="1"/>
+              <a:t>Mostrar</a:t>
+            </a:r>
+            <a:r>
+              <a:rPr lang="en-US" dirty="0"/>
+              <a:t> </a:t>
+            </a:r>
+            <a:r>
+              <a:rPr lang="en-US" dirty="0" err="1"/>
+              <a:t>Apartamento</a:t>
+            </a:r>
+            <a:r>
+              <a:rPr lang="en-US" dirty="0"/>
+              <a:t>)</a:t>
+            </a:r>
+            <a:endParaRPr lang="es-CO" dirty="0"/>
+          </a:p>
+        </p:txBody>
+      </p:sp>
+      <p:sp>
+        <p:nvSpPr>
+          <p:cNvPr id="2" name="Diagrama de flujo: proceso predefinido 1">
+            <a:extLst>
+              <a:ext uri="{FF2B5EF4-FFF2-40B4-BE49-F238E27FC236}">
+                <a16:creationId xmlns:a16="http://schemas.microsoft.com/office/drawing/2014/main" id="{31C09B22-195C-4A2E-9FB2-9D88F25F64B1}"/>
+              </a:ext>
+            </a:extLst>
+          </p:cNvPr>
+          <p:cNvSpPr/>
+          <p:nvPr/>
+        </p:nvSpPr>
+        <p:spPr>
+          <a:xfrm>
+            <a:off x="5086350" y="2688431"/>
+            <a:ext cx="2019300" cy="1033435"/>
+          </a:xfrm>
+          <a:prstGeom prst="flowChartPredefinedProcess">
+            <a:avLst/>
+          </a:prstGeom>
+          <a:noFill/>
+          <a:ln>
+            <a:solidFill>
+              <a:schemeClr val="accent4">
+                <a:lumMod val="75000"/>
+              </a:schemeClr>
+            </a:solidFill>
+          </a:ln>
+        </p:spPr>
+        <p:style>
+          <a:lnRef idx="2">
+            <a:schemeClr val="accent1">
+              <a:shade val="50000"/>
+            </a:schemeClr>
+          </a:lnRef>
+          <a:fillRef idx="1">
+            <a:schemeClr val="accent1"/>
+          </a:fillRef>
+          <a:effectRef idx="0">
+            <a:schemeClr val="accent1"/>
+          </a:effectRef>
+          <a:fontRef idx="minor">
+            <a:schemeClr val="lt1"/>
+          </a:fontRef>
+        </p:style>
+        <p:txBody>
+          <a:bodyPr rtlCol="0" anchor="ctr"/>
+          <a:lstStyle/>
+          <a:p>
+            <a:pPr algn="ctr"/>
+            <a:r>
+              <a:rPr lang="en-US" sz="1200" dirty="0" err="1">
+                <a:solidFill>
+                  <a:schemeClr val="tx1"/>
+                </a:solidFill>
+              </a:rPr>
+              <a:t>Mostrar_Fichas_aleatorias</a:t>
+            </a:r>
+            <a:endParaRPr lang="en-US" sz="1200" dirty="0">
+              <a:solidFill>
+                <a:schemeClr val="tx1"/>
+              </a:solidFill>
+            </a:endParaRPr>
+          </a:p>
+        </p:txBody>
+      </p:sp>
+      <p:sp>
+        <p:nvSpPr>
+          <p:cNvPr id="36" name="Diagrama de flujo: terminador 35">
+            <a:extLst>
+              <a:ext uri="{FF2B5EF4-FFF2-40B4-BE49-F238E27FC236}">
+                <a16:creationId xmlns:a16="http://schemas.microsoft.com/office/drawing/2014/main" id="{469FFF8E-671C-440C-A77E-75C2FD25319B}"/>
+              </a:ext>
+            </a:extLst>
+          </p:cNvPr>
+          <p:cNvSpPr/>
+          <p:nvPr/>
+        </p:nvSpPr>
+        <p:spPr>
+          <a:xfrm>
+            <a:off x="5355291" y="4106833"/>
+            <a:ext cx="1662112" cy="785812"/>
+          </a:xfrm>
+          <a:prstGeom prst="flowChartTerminator">
+            <a:avLst/>
+          </a:prstGeom>
+          <a:ln>
+            <a:solidFill>
+              <a:srgbClr val="92D050"/>
+            </a:solidFill>
+          </a:ln>
+        </p:spPr>
+        <p:style>
+          <a:lnRef idx="2">
+            <a:schemeClr val="accent4"/>
+          </a:lnRef>
+          <a:fillRef idx="1">
+            <a:schemeClr val="lt1"/>
+          </a:fillRef>
+          <a:effectRef idx="0">
+            <a:schemeClr val="accent4"/>
+          </a:effectRef>
+          <a:fontRef idx="minor">
+            <a:schemeClr val="dk1"/>
+          </a:fontRef>
+        </p:style>
+        <p:txBody>
+          <a:bodyPr rtlCol="0" anchor="ctr"/>
+          <a:lstStyle/>
+          <a:p>
+            <a:pPr algn="ctr"/>
+            <a:r>
+              <a:rPr lang="en-US" sz="1600" dirty="0"/>
+              <a:t>CSV (</a:t>
+            </a:r>
+            <a:r>
+              <a:rPr lang="en-US" sz="1600" dirty="0" err="1"/>
+              <a:t>Separado</a:t>
+            </a:r>
+            <a:r>
+              <a:rPr lang="en-US" sz="1600" dirty="0"/>
+              <a:t> por “;”) -Individual</a:t>
+            </a:r>
+            <a:endParaRPr lang="es-CO" sz="1600" dirty="0"/>
+          </a:p>
+        </p:txBody>
+      </p:sp>
+      <p:sp>
+        <p:nvSpPr>
+          <p:cNvPr id="8" name="Globo: flecha izquierda 7">
+            <a:extLst>
+              <a:ext uri="{FF2B5EF4-FFF2-40B4-BE49-F238E27FC236}">
+                <a16:creationId xmlns:a16="http://schemas.microsoft.com/office/drawing/2014/main" id="{C4686E9C-F5D0-4E75-93C7-C635F8EA496A}"/>
+              </a:ext>
+            </a:extLst>
+          </p:cNvPr>
+          <p:cNvSpPr/>
+          <p:nvPr/>
+        </p:nvSpPr>
+        <p:spPr>
+          <a:xfrm>
+            <a:off x="11157977" y="1162050"/>
+            <a:ext cx="661987" cy="1628775"/>
+          </a:xfrm>
+          <a:prstGeom prst="leftArrowCallout">
+            <a:avLst/>
+          </a:prstGeom>
+          <a:ln>
+            <a:solidFill>
+              <a:srgbClr val="FF0000"/>
+            </a:solidFill>
+          </a:ln>
+        </p:spPr>
+        <p:style>
+          <a:lnRef idx="2">
+            <a:schemeClr val="accent6"/>
+          </a:lnRef>
+          <a:fillRef idx="1">
+            <a:schemeClr val="lt1"/>
+          </a:fillRef>
+          <a:effectRef idx="0">
+            <a:schemeClr val="accent6"/>
+          </a:effectRef>
+          <a:fontRef idx="minor">
+            <a:schemeClr val="dk1"/>
+          </a:fontRef>
+        </p:style>
+        <p:txBody>
+          <a:bodyPr vert="vert270" rtlCol="0" anchor="ctr"/>
+          <a:lstStyle/>
+          <a:p>
+            <a:pPr algn="ctr"/>
+            <a:r>
+              <a:rPr lang="en-US" dirty="0"/>
+              <a:t>Entradas</a:t>
+            </a:r>
+            <a:endParaRPr lang="es-CO" dirty="0"/>
+          </a:p>
+        </p:txBody>
+      </p:sp>
+      <p:sp>
+        <p:nvSpPr>
+          <p:cNvPr id="37" name="Globo: flecha izquierda 36">
+            <a:extLst>
+              <a:ext uri="{FF2B5EF4-FFF2-40B4-BE49-F238E27FC236}">
+                <a16:creationId xmlns:a16="http://schemas.microsoft.com/office/drawing/2014/main" id="{FACD5601-1B77-499C-907B-651020E40E5F}"/>
+              </a:ext>
+            </a:extLst>
+          </p:cNvPr>
+          <p:cNvSpPr/>
+          <p:nvPr/>
+        </p:nvSpPr>
+        <p:spPr>
+          <a:xfrm>
+            <a:off x="11157975" y="4431506"/>
+            <a:ext cx="661987" cy="1628775"/>
+          </a:xfrm>
+          <a:prstGeom prst="leftArrowCallout">
+            <a:avLst/>
+          </a:prstGeom>
+        </p:spPr>
+        <p:style>
+          <a:lnRef idx="2">
+            <a:schemeClr val="accent6"/>
+          </a:lnRef>
+          <a:fillRef idx="1">
+            <a:schemeClr val="lt1"/>
+          </a:fillRef>
+          <a:effectRef idx="0">
+            <a:schemeClr val="accent6"/>
+          </a:effectRef>
+          <a:fontRef idx="minor">
+            <a:schemeClr val="dk1"/>
+          </a:fontRef>
+        </p:style>
+        <p:txBody>
+          <a:bodyPr vert="vert270" rtlCol="0" anchor="ctr"/>
+          <a:lstStyle/>
+          <a:p>
+            <a:pPr algn="ctr"/>
+            <a:r>
+              <a:rPr lang="en-US" dirty="0" err="1"/>
+              <a:t>Salidas</a:t>
+            </a:r>
+            <a:endParaRPr lang="es-CO" dirty="0"/>
+          </a:p>
+        </p:txBody>
+      </p:sp>
+      <p:sp>
+        <p:nvSpPr>
+          <p:cNvPr id="38" name="Globo: flecha izquierda 37">
+            <a:extLst>
+              <a:ext uri="{FF2B5EF4-FFF2-40B4-BE49-F238E27FC236}">
+                <a16:creationId xmlns:a16="http://schemas.microsoft.com/office/drawing/2014/main" id="{76940751-7CE2-4158-8FE3-B062E387FC5C}"/>
+              </a:ext>
+            </a:extLst>
+          </p:cNvPr>
+          <p:cNvSpPr/>
+          <p:nvPr/>
+        </p:nvSpPr>
+        <p:spPr>
+          <a:xfrm>
+            <a:off x="11157976" y="2802731"/>
+            <a:ext cx="661987" cy="1628775"/>
+          </a:xfrm>
+          <a:prstGeom prst="leftArrowCallout">
+            <a:avLst/>
+          </a:prstGeom>
+          <a:ln>
+            <a:solidFill>
+              <a:schemeClr val="accent4">
+                <a:lumMod val="75000"/>
+              </a:schemeClr>
+            </a:solidFill>
+          </a:ln>
+        </p:spPr>
+        <p:style>
+          <a:lnRef idx="2">
+            <a:schemeClr val="accent6"/>
+          </a:lnRef>
+          <a:fillRef idx="1">
+            <a:schemeClr val="lt1"/>
+          </a:fillRef>
+          <a:effectRef idx="0">
+            <a:schemeClr val="accent6"/>
+          </a:effectRef>
+          <a:fontRef idx="minor">
+            <a:schemeClr val="dk1"/>
+          </a:fontRef>
+        </p:style>
+        <p:txBody>
+          <a:bodyPr vert="vert270" rtlCol="0" anchor="ctr"/>
+          <a:lstStyle/>
+          <a:p>
+            <a:pPr algn="ctr"/>
+            <a:r>
+              <a:rPr lang="en-US" dirty="0" err="1"/>
+              <a:t>Funciones</a:t>
+            </a:r>
+            <a:endParaRPr lang="es-CO" dirty="0"/>
+          </a:p>
+        </p:txBody>
+      </p:sp>
+      <p:sp>
+        <p:nvSpPr>
+          <p:cNvPr id="40" name="Diagrama de flujo: terminador 39">
+            <a:extLst>
+              <a:ext uri="{FF2B5EF4-FFF2-40B4-BE49-F238E27FC236}">
+                <a16:creationId xmlns:a16="http://schemas.microsoft.com/office/drawing/2014/main" id="{BE5C8B2D-8CB1-4F2D-9AC1-E6DDDA21B085}"/>
+              </a:ext>
+            </a:extLst>
+          </p:cNvPr>
+          <p:cNvSpPr/>
+          <p:nvPr/>
+        </p:nvSpPr>
+        <p:spPr>
+          <a:xfrm>
+            <a:off x="5355291" y="5160169"/>
+            <a:ext cx="1662112" cy="785812"/>
+          </a:xfrm>
+          <a:prstGeom prst="flowChartTerminator">
+            <a:avLst/>
+          </a:prstGeom>
+          <a:ln>
+            <a:solidFill>
+              <a:srgbClr val="92D050"/>
+            </a:solidFill>
+          </a:ln>
+        </p:spPr>
+        <p:style>
+          <a:lnRef idx="2">
+            <a:schemeClr val="accent4"/>
+          </a:lnRef>
+          <a:fillRef idx="1">
+            <a:schemeClr val="lt1"/>
+          </a:fillRef>
+          <a:effectRef idx="0">
+            <a:schemeClr val="accent4"/>
+          </a:effectRef>
+          <a:fontRef idx="minor">
+            <a:schemeClr val="dk1"/>
+          </a:fontRef>
+        </p:style>
+        <p:txBody>
+          <a:bodyPr rtlCol="0" anchor="ctr"/>
+          <a:lstStyle/>
+          <a:p>
+            <a:pPr algn="ctr"/>
+            <a:r>
+              <a:rPr lang="en-US" sz="1600" dirty="0"/>
+              <a:t>INSERT _ </a:t>
+            </a:r>
+            <a:r>
+              <a:rPr lang="en-US" sz="1600" dirty="0" err="1"/>
+              <a:t>Tabla</a:t>
+            </a:r>
+            <a:r>
+              <a:rPr lang="en-US" sz="1600" dirty="0"/>
+              <a:t>_ RATINGS</a:t>
+            </a:r>
+            <a:endParaRPr lang="es-CO" sz="1600" dirty="0"/>
+          </a:p>
+        </p:txBody>
+      </p:sp>
+      <p:sp>
+        <p:nvSpPr>
+          <p:cNvPr id="15" name="Diagrama de flujo: terminador 14">
+            <a:extLst>
+              <a:ext uri="{FF2B5EF4-FFF2-40B4-BE49-F238E27FC236}">
+                <a16:creationId xmlns:a16="http://schemas.microsoft.com/office/drawing/2014/main" id="{44E411D2-2A91-4BD4-892E-6DCE8C1E5EA8}"/>
+              </a:ext>
+            </a:extLst>
+          </p:cNvPr>
+          <p:cNvSpPr/>
+          <p:nvPr/>
+        </p:nvSpPr>
+        <p:spPr>
+          <a:xfrm>
+            <a:off x="5264944" y="1525581"/>
+            <a:ext cx="1662112" cy="785812"/>
+          </a:xfrm>
+          <a:prstGeom prst="flowChartTerminator">
+            <a:avLst/>
+          </a:prstGeom>
+          <a:ln>
+            <a:solidFill>
+              <a:srgbClr val="FF0000"/>
+            </a:solidFill>
+          </a:ln>
+        </p:spPr>
+        <p:style>
+          <a:lnRef idx="2">
+            <a:schemeClr val="accent4"/>
+          </a:lnRef>
+          <a:fillRef idx="1">
+            <a:schemeClr val="lt1"/>
+          </a:fillRef>
+          <a:effectRef idx="0">
+            <a:schemeClr val="accent4"/>
+          </a:effectRef>
+          <a:fontRef idx="minor">
+            <a:schemeClr val="dk1"/>
+          </a:fontRef>
+        </p:style>
+        <p:txBody>
+          <a:bodyPr rtlCol="0" anchor="ctr"/>
+          <a:lstStyle/>
+          <a:p>
+            <a:pPr algn="ctr"/>
+            <a:r>
+              <a:rPr lang="en-US" sz="1600" dirty="0" err="1"/>
+              <a:t>Ficha</a:t>
+            </a:r>
+            <a:r>
+              <a:rPr lang="en-US" sz="1600" dirty="0"/>
+              <a:t> </a:t>
+            </a:r>
+            <a:r>
+              <a:rPr lang="en-US" sz="1600" dirty="0" err="1"/>
+              <a:t>en</a:t>
+            </a:r>
+            <a:r>
+              <a:rPr lang="en-US" sz="1600" dirty="0"/>
+              <a:t> HTML</a:t>
+            </a:r>
+            <a:endParaRPr lang="es-CO" sz="1600" dirty="0"/>
+          </a:p>
+        </p:txBody>
+      </p:sp>
+      <p:sp>
+        <p:nvSpPr>
+          <p:cNvPr id="16" name="Diagrama de flujo: documento 15">
+            <a:extLst>
+              <a:ext uri="{FF2B5EF4-FFF2-40B4-BE49-F238E27FC236}">
+                <a16:creationId xmlns:a16="http://schemas.microsoft.com/office/drawing/2014/main" id="{B9B92D79-EC93-4175-AE8F-D5761FD2AB37}"/>
+              </a:ext>
+            </a:extLst>
+          </p:cNvPr>
+          <p:cNvSpPr/>
+          <p:nvPr/>
+        </p:nvSpPr>
+        <p:spPr>
+          <a:xfrm>
+            <a:off x="7786124" y="4230686"/>
+            <a:ext cx="2216945" cy="523018"/>
+          </a:xfrm>
+          <a:prstGeom prst="flowChartDocument">
+            <a:avLst/>
+          </a:prstGeom>
+        </p:spPr>
+        <p:style>
+          <a:lnRef idx="2">
+            <a:schemeClr val="accent6"/>
+          </a:lnRef>
+          <a:fillRef idx="1">
+            <a:schemeClr val="lt1"/>
+          </a:fillRef>
+          <a:effectRef idx="0">
+            <a:schemeClr val="accent6"/>
+          </a:effectRef>
+          <a:fontRef idx="minor">
+            <a:schemeClr val="dk1"/>
+          </a:fontRef>
+        </p:style>
+        <p:txBody>
+          <a:bodyPr rtlCol="0" anchor="ctr"/>
+          <a:lstStyle/>
+          <a:p>
+            <a:pPr algn="ctr"/>
+            <a:r>
+              <a:rPr lang="es-CO" dirty="0"/>
+              <a:t>Rating_Client.csv</a:t>
+            </a:r>
+          </a:p>
+        </p:txBody>
+      </p:sp>
+    </p:spTree>
+    <p:extLst>
+      <p:ext uri="{BB962C8B-B14F-4D97-AF65-F5344CB8AC3E}">
+        <p14:creationId xmlns:p14="http://schemas.microsoft.com/office/powerpoint/2010/main" val="950132881"/>
       </p:ext>
     </p:extLst>
   </p:cSld>

</xml_diff>